<commit_message>
Move Adam's images to docs/images. Update McCrea's slides.
</commit_message>
<xml_diff>
--- a/docs/images/project_and_data_life_cycles_graphic.pptx
+++ b/docs/images/project_and_data_life_cycles_graphic.pptx
@@ -5,7 +5,7 @@
     <p:sldMasterId id="2147483660" r:id="rId4"/>
   </p:sldMasterIdLst>
   <p:sldIdLst>
-    <p:sldId id="257" r:id="rId5"/>
+    <p:sldId id="258" r:id="rId5"/>
   </p:sldIdLst>
   <p:sldSz cx="12192000" cy="6858000"/>
   <p:notesSz cx="6858000" cy="9144000"/>
@@ -104,6 +104,11 @@
       </a:defRPr>
     </a:lvl9pPr>
   </p:defaultTextStyle>
+  <p:extLst>
+    <p:ext uri="{EFAFB233-063F-42B5-8137-9DF3F51BA10A}">
+      <p15:sldGuideLst xmlns:p15="http://schemas.microsoft.com/office/powerpoint/2012/main"/>
+    </p:ext>
+  </p:extLst>
 </p:presentation>
 </file>
 
@@ -236,7 +241,7 @@
           <a:p>
             <a:fld id="{D61C0432-C87A-464A-83B7-08B24A8F2EDF}" type="datetimeFigureOut">
               <a:rPr lang="en-US" smtClean="0"/>
-              <a:t>5/27/2020</a:t>
+              <a:t>6/18/2020</a:t>
             </a:fld>
             <a:endParaRPr lang="en-US"/>
           </a:p>
@@ -404,7 +409,7 @@
           <a:p>
             <a:fld id="{D61C0432-C87A-464A-83B7-08B24A8F2EDF}" type="datetimeFigureOut">
               <a:rPr lang="en-US" smtClean="0"/>
-              <a:t>5/27/2020</a:t>
+              <a:t>6/18/2020</a:t>
             </a:fld>
             <a:endParaRPr lang="en-US"/>
           </a:p>
@@ -582,7 +587,7 @@
           <a:p>
             <a:fld id="{D61C0432-C87A-464A-83B7-08B24A8F2EDF}" type="datetimeFigureOut">
               <a:rPr lang="en-US" smtClean="0"/>
-              <a:t>5/27/2020</a:t>
+              <a:t>6/18/2020</a:t>
             </a:fld>
             <a:endParaRPr lang="en-US"/>
           </a:p>
@@ -750,7 +755,7 @@
           <a:p>
             <a:fld id="{D61C0432-C87A-464A-83B7-08B24A8F2EDF}" type="datetimeFigureOut">
               <a:rPr lang="en-US" smtClean="0"/>
-              <a:t>5/27/2020</a:t>
+              <a:t>6/18/2020</a:t>
             </a:fld>
             <a:endParaRPr lang="en-US"/>
           </a:p>
@@ -995,7 +1000,7 @@
           <a:p>
             <a:fld id="{D61C0432-C87A-464A-83B7-08B24A8F2EDF}" type="datetimeFigureOut">
               <a:rPr lang="en-US" smtClean="0"/>
-              <a:t>5/27/2020</a:t>
+              <a:t>6/18/2020</a:t>
             </a:fld>
             <a:endParaRPr lang="en-US"/>
           </a:p>
@@ -1224,7 +1229,7 @@
           <a:p>
             <a:fld id="{D61C0432-C87A-464A-83B7-08B24A8F2EDF}" type="datetimeFigureOut">
               <a:rPr lang="en-US" smtClean="0"/>
-              <a:t>5/27/2020</a:t>
+              <a:t>6/18/2020</a:t>
             </a:fld>
             <a:endParaRPr lang="en-US"/>
           </a:p>
@@ -1588,7 +1593,7 @@
           <a:p>
             <a:fld id="{D61C0432-C87A-464A-83B7-08B24A8F2EDF}" type="datetimeFigureOut">
               <a:rPr lang="en-US" smtClean="0"/>
-              <a:t>5/27/2020</a:t>
+              <a:t>6/18/2020</a:t>
             </a:fld>
             <a:endParaRPr lang="en-US"/>
           </a:p>
@@ -1705,7 +1710,7 @@
           <a:p>
             <a:fld id="{D61C0432-C87A-464A-83B7-08B24A8F2EDF}" type="datetimeFigureOut">
               <a:rPr lang="en-US" smtClean="0"/>
-              <a:t>5/27/2020</a:t>
+              <a:t>6/18/2020</a:t>
             </a:fld>
             <a:endParaRPr lang="en-US"/>
           </a:p>
@@ -1800,7 +1805,7 @@
           <a:p>
             <a:fld id="{D61C0432-C87A-464A-83B7-08B24A8F2EDF}" type="datetimeFigureOut">
               <a:rPr lang="en-US" smtClean="0"/>
-              <a:t>5/27/2020</a:t>
+              <a:t>6/18/2020</a:t>
             </a:fld>
             <a:endParaRPr lang="en-US"/>
           </a:p>
@@ -2075,7 +2080,7 @@
           <a:p>
             <a:fld id="{D61C0432-C87A-464A-83B7-08B24A8F2EDF}" type="datetimeFigureOut">
               <a:rPr lang="en-US" smtClean="0"/>
-              <a:t>5/27/2020</a:t>
+              <a:t>6/18/2020</a:t>
             </a:fld>
             <a:endParaRPr lang="en-US"/>
           </a:p>
@@ -2327,7 +2332,7 @@
           <a:p>
             <a:fld id="{D61C0432-C87A-464A-83B7-08B24A8F2EDF}" type="datetimeFigureOut">
               <a:rPr lang="en-US" smtClean="0"/>
-              <a:t>5/27/2020</a:t>
+              <a:t>6/18/2020</a:t>
             </a:fld>
             <a:endParaRPr lang="en-US"/>
           </a:p>
@@ -2543,7 +2548,7 @@
           <a:p>
             <a:fld id="{D61C0432-C87A-464A-83B7-08B24A8F2EDF}" type="datetimeFigureOut">
               <a:rPr lang="en-US" smtClean="0"/>
-              <a:t>5/27/2020</a:t>
+              <a:t>6/18/2020</a:t>
             </a:fld>
             <a:endParaRPr lang="en-US"/>
           </a:p>
@@ -2970,7 +2975,7 @@
         </p:nvGraphicFramePr>
         <p:xfrm>
           <a:off x="112580" y="274320"/>
-          <a:ext cx="11966840" cy="5137022"/>
+          <a:ext cx="11990215" cy="5186601"/>
         </p:xfrm>
         <a:graphic>
           <a:graphicData uri="http://schemas.openxmlformats.org/drawingml/2006/table">
@@ -3033,7 +3038,7 @@
                     </a:ext>
                   </a:extLst>
                 </a:gridCol>
-                <a:gridCol w="873548">
+                <a:gridCol w="873549">
                   <a:extLst>
                     <a:ext uri="{9D8B030D-6E8A-4147-A177-3AD203B41FA5}">
                       <a16:colId xmlns:a16="http://schemas.microsoft.com/office/drawing/2014/main" val="1647838157"/>
@@ -3061,42 +3066,56 @@
                     </a:ext>
                   </a:extLst>
                 </a:gridCol>
-                <a:gridCol w="611483">
+                <a:gridCol w="356370">
                   <a:extLst>
                     <a:ext uri="{9D8B030D-6E8A-4147-A177-3AD203B41FA5}">
                       <a16:colId xmlns:a16="http://schemas.microsoft.com/office/drawing/2014/main" val="3212572908"/>
                     </a:ext>
                   </a:extLst>
                 </a:gridCol>
-                <a:gridCol w="611483">
+                <a:gridCol w="274320">
+                  <a:extLst>
+                    <a:ext uri="{9D8B030D-6E8A-4147-A177-3AD203B41FA5}">
+                      <a16:colId xmlns:a16="http://schemas.microsoft.com/office/drawing/2014/main" val="1440184666"/>
+                    </a:ext>
+                  </a:extLst>
+                </a:gridCol>
+                <a:gridCol w="192943">
                   <a:extLst>
                     <a:ext uri="{9D8B030D-6E8A-4147-A177-3AD203B41FA5}">
                       <a16:colId xmlns:a16="http://schemas.microsoft.com/office/drawing/2014/main" val="3871071877"/>
                     </a:ext>
                   </a:extLst>
                 </a:gridCol>
-                <a:gridCol w="457200">
+                <a:gridCol w="548640">
+                  <a:extLst>
+                    <a:ext uri="{9D8B030D-6E8A-4147-A177-3AD203B41FA5}">
+                      <a16:colId xmlns:a16="http://schemas.microsoft.com/office/drawing/2014/main" val="221718861"/>
+                    </a:ext>
+                  </a:extLst>
+                </a:gridCol>
+                <a:gridCol w="102667">
                   <a:extLst>
                     <a:ext uri="{9D8B030D-6E8A-4147-A177-3AD203B41FA5}">
                       <a16:colId xmlns:a16="http://schemas.microsoft.com/office/drawing/2014/main" val="1954648358"/>
                     </a:ext>
                   </a:extLst>
                 </a:gridCol>
-                <a:gridCol w="594360">
+                <a:gridCol w="822960">
                   <a:extLst>
                     <a:ext uri="{9D8B030D-6E8A-4147-A177-3AD203B41FA5}">
-                      <a16:colId xmlns:a16="http://schemas.microsoft.com/office/drawing/2014/main" val="184915891"/>
+                      <a16:colId xmlns:a16="http://schemas.microsoft.com/office/drawing/2014/main" val="3055938023"/>
                     </a:ext>
                   </a:extLst>
                 </a:gridCol>
-                <a:gridCol w="1005840">
+                <a:gridCol w="1023208">
                   <a:extLst>
                     <a:ext uri="{9D8B030D-6E8A-4147-A177-3AD203B41FA5}">
                       <a16:colId xmlns:a16="http://schemas.microsoft.com/office/drawing/2014/main" val="1905728333"/>
                     </a:ext>
                   </a:extLst>
                 </a:gridCol>
-                <a:gridCol w="578352">
+                <a:gridCol w="560984">
                   <a:extLst>
                     <a:ext uri="{9D8B030D-6E8A-4147-A177-3AD203B41FA5}">
                       <a16:colId xmlns:a16="http://schemas.microsoft.com/office/drawing/2014/main" val="3883069073"/>
@@ -3105,7 +3124,7 @@
                 </a:gridCol>
               </a:tblGrid>
               <a:tr h="451057">
-                <a:tc gridSpan="17">
+                <a:tc gridSpan="18">
                   <a:txBody>
                     <a:bodyPr/>
                     <a:lstStyle/>
@@ -3161,10 +3180,7 @@
                       <a:tailEnd type="none" w="med" len="med"/>
                     </a:lnB>
                     <a:solidFill>
-                      <a:schemeClr val="accent6">
-                        <a:lumMod val="60000"/>
-                        <a:lumOff val="40000"/>
-                      </a:schemeClr>
+                      <a:srgbClr val="57C170"/>
                     </a:solidFill>
                   </a:tcPr>
                 </a:tc>
@@ -3328,12 +3344,82 @@
                   </a:txBody>
                   <a:tcPr/>
                 </a:tc>
+                <a:tc hMerge="1">
+                  <a:txBody>
+                    <a:bodyPr/>
+                    <a:lstStyle/>
+                    <a:p>
+                      <a:endParaRPr lang="en-US"/>
+                    </a:p>
+                  </a:txBody>
+                  <a:tcPr/>
+                </a:tc>
+                <a:tc rowSpan="5">
+                  <a:txBody>
+                    <a:bodyPr/>
+                    <a:lstStyle/>
+                    <a:p>
+                      <a:endParaRPr lang="en-US" dirty="0"/>
+                    </a:p>
+                  </a:txBody>
+                  <a:tcPr marL="5001" marR="5001" marT="5001" marB="0" anchor="b">
+                    <a:lnL w="19050" cap="flat" cmpd="sng" algn="ctr">
+                      <a:solidFill>
+                        <a:schemeClr val="tx1"/>
+                      </a:solidFill>
+                      <a:prstDash val="solid"/>
+                      <a:round/>
+                      <a:headEnd type="none" w="med" len="med"/>
+                      <a:tailEnd type="none" w="med" len="med"/>
+                    </a:lnL>
+                    <a:lnR w="19050" cap="flat" cmpd="sng" algn="ctr">
+                      <a:solidFill>
+                        <a:schemeClr val="tx1"/>
+                      </a:solidFill>
+                      <a:prstDash val="solid"/>
+                      <a:round/>
+                      <a:headEnd type="none" w="med" len="med"/>
+                      <a:tailEnd type="none" w="med" len="med"/>
+                    </a:lnR>
+                    <a:lnT w="19050" cap="flat" cmpd="sng" algn="ctr">
+                      <a:solidFill>
+                        <a:schemeClr val="tx1"/>
+                      </a:solidFill>
+                      <a:prstDash val="solid"/>
+                      <a:round/>
+                      <a:headEnd type="none" w="med" len="med"/>
+                      <a:tailEnd type="none" w="med" len="med"/>
+                    </a:lnT>
+                    <a:lnB w="19050" cap="flat" cmpd="sng" algn="ctr">
+                      <a:solidFill>
+                        <a:schemeClr val="tx1"/>
+                      </a:solidFill>
+                      <a:prstDash val="solid"/>
+                      <a:round/>
+                      <a:headEnd type="none" w="med" len="med"/>
+                      <a:tailEnd type="none" w="med" len="med"/>
+                    </a:lnB>
+                    <a:solidFill>
+                      <a:schemeClr val="tx1"/>
+                    </a:solidFill>
+                  </a:tcPr>
+                </a:tc>
                 <a:tc rowSpan="11">
                   <a:txBody>
                     <a:bodyPr/>
                     <a:lstStyle/>
                     <a:p>
                       <a:pPr algn="ctr" fontAlgn="b"/>
+                      <a:r>
+                        <a:rPr lang="en-US" sz="2400" b="0" i="0" u="none" strike="noStrike" dirty="0" smtClean="0">
+                          <a:solidFill>
+                            <a:srgbClr val="000000"/>
+                          </a:solidFill>
+                          <a:effectLst/>
+                          <a:latin typeface="+mn-lt"/>
+                        </a:rPr>
+                        <a:t>Revise &amp; </a:t>
+                      </a:r>
                       <a:r>
                         <a:rPr lang="en-US" sz="2400" b="0" i="0" u="none" strike="noStrike" dirty="0">
                           <a:solidFill>
@@ -3342,7 +3428,7 @@
                           <a:effectLst/>
                           <a:latin typeface="+mn-lt"/>
                         </a:rPr>
-                        <a:t>Learn, Revise, Repeat as Needed</a:t>
+                        <a:t>Repeat as Needed</a:t>
                       </a:r>
                     </a:p>
                   </a:txBody>
@@ -3385,8 +3471,8 @@
                     </a:lnB>
                     <a:solidFill>
                       <a:schemeClr val="accent4">
-                        <a:lumMod val="40000"/>
-                        <a:lumOff val="60000"/>
+                        <a:lumMod val="60000"/>
+                        <a:lumOff val="40000"/>
                       </a:schemeClr>
                     </a:solidFill>
                   </a:tcPr>
@@ -3454,10 +3540,7 @@
                       <a:tailEnd type="none" w="med" len="med"/>
                     </a:lnB>
                     <a:solidFill>
-                      <a:schemeClr val="accent6">
-                        <a:lumMod val="20000"/>
-                        <a:lumOff val="80000"/>
-                      </a:schemeClr>
+                      <a:srgbClr val="AAFCB2"/>
                     </a:solidFill>
                   </a:tcPr>
                 </a:tc>
@@ -3541,7 +3624,7 @@
                   </a:txBody>
                   <a:tcPr/>
                 </a:tc>
-                <a:tc gridSpan="8">
+                <a:tc gridSpan="9">
                   <a:txBody>
                     <a:bodyPr/>
                     <a:lstStyle/>
@@ -3597,10 +3680,7 @@
                       <a:tailEnd type="none" w="med" len="med"/>
                     </a:lnB>
                     <a:solidFill>
-                      <a:schemeClr val="accent6">
-                        <a:lumMod val="20000"/>
-                        <a:lumOff val="80000"/>
-                      </a:schemeClr>
+                      <a:srgbClr val="AEFDA1"/>
                     </a:solidFill>
                   </a:tcPr>
                 </a:tc>
@@ -3673,6 +3753,66 @@
                     </a:p>
                   </a:txBody>
                   <a:tcPr/>
+                </a:tc>
+                <a:tc hMerge="1">
+                  <a:txBody>
+                    <a:bodyPr/>
+                    <a:lstStyle/>
+                    <a:p>
+                      <a:endParaRPr lang="en-US"/>
+                    </a:p>
+                  </a:txBody>
+                  <a:tcPr/>
+                </a:tc>
+                <a:tc vMerge="1">
+                  <a:txBody>
+                    <a:bodyPr/>
+                    <a:lstStyle/>
+                    <a:p>
+                      <a:endParaRPr lang="en-US" dirty="0"/>
+                    </a:p>
+                  </a:txBody>
+                  <a:tcPr marL="5001" marR="5001" marT="5001" marB="0" anchor="b">
+                    <a:lnL w="19050" cap="flat" cmpd="sng" algn="ctr">
+                      <a:solidFill>
+                        <a:schemeClr val="tx1"/>
+                      </a:solidFill>
+                      <a:prstDash val="solid"/>
+                      <a:round/>
+                      <a:headEnd type="none" w="med" len="med"/>
+                      <a:tailEnd type="none" w="med" len="med"/>
+                    </a:lnL>
+                    <a:lnR w="19050" cap="flat" cmpd="sng" algn="ctr">
+                      <a:solidFill>
+                        <a:schemeClr val="tx1"/>
+                      </a:solidFill>
+                      <a:prstDash val="solid"/>
+                      <a:round/>
+                      <a:headEnd type="none" w="med" len="med"/>
+                      <a:tailEnd type="none" w="med" len="med"/>
+                    </a:lnR>
+                    <a:lnT w="19050" cap="flat" cmpd="sng" algn="ctr">
+                      <a:solidFill>
+                        <a:schemeClr val="tx1"/>
+                      </a:solidFill>
+                      <a:prstDash val="solid"/>
+                      <a:round/>
+                      <a:headEnd type="none" w="med" len="med"/>
+                      <a:tailEnd type="none" w="med" len="med"/>
+                    </a:lnT>
+                    <a:lnB w="19050" cap="flat" cmpd="sng" algn="ctr">
+                      <a:solidFill>
+                        <a:schemeClr val="tx1"/>
+                      </a:solidFill>
+                      <a:prstDash val="solid"/>
+                      <a:round/>
+                      <a:headEnd type="none" w="med" len="med"/>
+                      <a:tailEnd type="none" w="med" len="med"/>
+                    </a:lnB>
+                    <a:solidFill>
+                      <a:schemeClr val="tx1"/>
+                    </a:solidFill>
+                  </a:tcPr>
                 </a:tc>
                 <a:tc vMerge="1">
                   <a:txBody>
@@ -3797,10 +3937,7 @@
                       <a:tailEnd type="none" w="med" len="med"/>
                     </a:lnB>
                     <a:solidFill>
-                      <a:schemeClr val="accent6">
-                        <a:lumMod val="60000"/>
-                        <a:lumOff val="40000"/>
-                      </a:schemeClr>
+                      <a:srgbClr val="AAFCB2"/>
                     </a:solidFill>
                   </a:tcPr>
                 </a:tc>
@@ -3860,10 +3997,7 @@
                       <a:tailEnd type="none" w="med" len="med"/>
                     </a:lnB>
                     <a:solidFill>
-                      <a:schemeClr val="accent6">
-                        <a:lumMod val="60000"/>
-                        <a:lumOff val="40000"/>
-                      </a:schemeClr>
+                      <a:srgbClr val="AAFCB2"/>
                     </a:solidFill>
                   </a:tcPr>
                 </a:tc>
@@ -3923,10 +4057,7 @@
                       <a:tailEnd type="none" w="med" len="med"/>
                     </a:lnB>
                     <a:solidFill>
-                      <a:schemeClr val="accent6">
-                        <a:lumMod val="60000"/>
-                        <a:lumOff val="40000"/>
-                      </a:schemeClr>
+                      <a:srgbClr val="AAFCB2"/>
                     </a:solidFill>
                   </a:tcPr>
                 </a:tc>
@@ -3990,7 +4121,7 @@
                   </a:txBody>
                   <a:tcPr/>
                 </a:tc>
-                <a:tc gridSpan="5">
+                <a:tc gridSpan="4">
                   <a:txBody>
                     <a:bodyPr/>
                     <a:lstStyle/>
@@ -4063,10 +4194,7 @@
                       <a:tailEnd type="none" w="med" len="med"/>
                     </a:lnB>
                     <a:solidFill>
-                      <a:schemeClr val="accent6">
-                        <a:lumMod val="60000"/>
-                        <a:lumOff val="40000"/>
-                      </a:schemeClr>
+                      <a:srgbClr val="AEFDA1"/>
                     </a:solidFill>
                   </a:tcPr>
                 </a:tc>
@@ -4100,17 +4228,7 @@
                   </a:txBody>
                   <a:tcPr/>
                 </a:tc>
-                <a:tc hMerge="1">
-                  <a:txBody>
-                    <a:bodyPr/>
-                    <a:lstStyle/>
-                    <a:p>
-                      <a:endParaRPr lang="en-US"/>
-                    </a:p>
-                  </a:txBody>
-                  <a:tcPr/>
-                </a:tc>
-                <a:tc gridSpan="2">
+                <a:tc gridSpan="4">
                   <a:txBody>
                     <a:bodyPr/>
                     <a:lstStyle/>
@@ -4166,10 +4284,7 @@
                       <a:tailEnd type="none" w="med" len="med"/>
                     </a:lnB>
                     <a:solidFill>
-                      <a:schemeClr val="accent6">
-                        <a:lumMod val="60000"/>
-                        <a:lumOff val="40000"/>
-                      </a:schemeClr>
+                      <a:srgbClr val="AEFDA1"/>
                     </a:solidFill>
                   </a:tcPr>
                 </a:tc>
@@ -4178,10 +4293,124 @@
                     <a:bodyPr/>
                     <a:lstStyle/>
                     <a:p>
-                      <a:endParaRPr lang="en-US"/>
-                    </a:p>
-                  </a:txBody>
-                  <a:tcPr/>
+                      <a:pPr algn="ctr" fontAlgn="b"/>
+                      <a:endParaRPr lang="en-US" sz="1300" b="1" i="0" u="none" strike="noStrike" dirty="0">
+                        <a:solidFill>
+                          <a:srgbClr val="000000"/>
+                        </a:solidFill>
+                        <a:effectLst/>
+                        <a:latin typeface="+mn-lt"/>
+                      </a:endParaRPr>
+                    </a:p>
+                  </a:txBody>
+                  <a:tcPr marL="5001" marR="5001" marT="5001" marB="0" anchor="b">
+                    <a:lnL w="6350" cap="flat" cmpd="sng" algn="ctr">
+                      <a:solidFill>
+                        <a:srgbClr val="000000"/>
+                      </a:solidFill>
+                      <a:prstDash val="solid"/>
+                      <a:round/>
+                      <a:headEnd type="none" w="med" len="med"/>
+                      <a:tailEnd type="none" w="med" len="med"/>
+                    </a:lnL>
+                    <a:lnR w="6350" cap="flat" cmpd="sng" algn="ctr">
+                      <a:solidFill>
+                        <a:srgbClr val="000000"/>
+                      </a:solidFill>
+                      <a:prstDash val="solid"/>
+                      <a:round/>
+                      <a:headEnd type="none" w="med" len="med"/>
+                      <a:tailEnd type="none" w="med" len="med"/>
+                    </a:lnR>
+                    <a:lnT w="6350" cap="flat" cmpd="sng" algn="ctr">
+                      <a:solidFill>
+                        <a:srgbClr val="000000"/>
+                      </a:solidFill>
+                      <a:prstDash val="solid"/>
+                      <a:round/>
+                      <a:headEnd type="none" w="med" len="med"/>
+                      <a:tailEnd type="none" w="med" len="med"/>
+                    </a:lnT>
+                    <a:lnB w="6350" cap="flat" cmpd="sng" algn="ctr">
+                      <a:solidFill>
+                        <a:srgbClr val="000000"/>
+                      </a:solidFill>
+                      <a:prstDash val="solid"/>
+                      <a:round/>
+                      <a:headEnd type="none" w="med" len="med"/>
+                      <a:tailEnd type="none" w="med" len="med"/>
+                    </a:lnB>
+                    <a:solidFill>
+                      <a:srgbClr val="AEFDA1"/>
+                    </a:solidFill>
+                  </a:tcPr>
+                </a:tc>
+                <a:tc hMerge="1">
+                  <a:txBody>
+                    <a:bodyPr/>
+                    <a:lstStyle/>
+                    <a:p>
+                      <a:endParaRPr lang="en-US"/>
+                    </a:p>
+                  </a:txBody>
+                  <a:tcPr/>
+                </a:tc>
+                <a:tc hMerge="1">
+                  <a:txBody>
+                    <a:bodyPr/>
+                    <a:lstStyle/>
+                    <a:p>
+                      <a:pPr algn="ctr" fontAlgn="b"/>
+                      <a:endParaRPr lang="en-US" sz="1300" b="1" i="0" u="none" strike="noStrike" dirty="0">
+                        <a:solidFill>
+                          <a:srgbClr val="000000"/>
+                        </a:solidFill>
+                        <a:effectLst/>
+                        <a:latin typeface="+mn-lt"/>
+                      </a:endParaRPr>
+                    </a:p>
+                  </a:txBody>
+                  <a:tcPr marL="5001" marR="5001" marT="5001" marB="0" anchor="b">
+                    <a:lnL w="6350" cap="flat" cmpd="sng" algn="ctr">
+                      <a:solidFill>
+                        <a:srgbClr val="000000"/>
+                      </a:solidFill>
+                      <a:prstDash val="solid"/>
+                      <a:round/>
+                      <a:headEnd type="none" w="med" len="med"/>
+                      <a:tailEnd type="none" w="med" len="med"/>
+                    </a:lnL>
+                    <a:lnR w="6350" cap="flat" cmpd="sng" algn="ctr">
+                      <a:solidFill>
+                        <a:srgbClr val="000000"/>
+                      </a:solidFill>
+                      <a:prstDash val="solid"/>
+                      <a:round/>
+                      <a:headEnd type="none" w="med" len="med"/>
+                      <a:tailEnd type="none" w="med" len="med"/>
+                    </a:lnR>
+                    <a:lnT w="6350" cap="flat" cmpd="sng" algn="ctr">
+                      <a:solidFill>
+                        <a:srgbClr val="000000"/>
+                      </a:solidFill>
+                      <a:prstDash val="solid"/>
+                      <a:round/>
+                      <a:headEnd type="none" w="med" len="med"/>
+                      <a:tailEnd type="none" w="med" len="med"/>
+                    </a:lnT>
+                    <a:lnB w="6350" cap="flat" cmpd="sng" algn="ctr">
+                      <a:solidFill>
+                        <a:srgbClr val="000000"/>
+                      </a:solidFill>
+                      <a:prstDash val="solid"/>
+                      <a:round/>
+                      <a:headEnd type="none" w="med" len="med"/>
+                      <a:tailEnd type="none" w="med" len="med"/>
+                    </a:lnB>
+                    <a:solidFill>
+                      <a:srgbClr val="AEFDA1"/>
+                    </a:solidFill>
+                  </a:tcPr>
                 </a:tc>
                 <a:tc>
                   <a:txBody>
@@ -4239,10 +4468,64 @@
                       <a:tailEnd type="none" w="med" len="med"/>
                     </a:lnB>
                     <a:solidFill>
-                      <a:schemeClr val="accent6">
-                        <a:lumMod val="60000"/>
-                        <a:lumOff val="40000"/>
-                      </a:schemeClr>
+                      <a:srgbClr val="AEFDA1"/>
+                    </a:solidFill>
+                  </a:tcPr>
+                </a:tc>
+                <a:tc vMerge="1">
+                  <a:txBody>
+                    <a:bodyPr/>
+                    <a:lstStyle/>
+                    <a:p>
+                      <a:pPr algn="ctr" fontAlgn="b"/>
+                      <a:endParaRPr lang="en-US" sz="1300" b="1" i="0" u="none" strike="noStrike" dirty="0">
+                        <a:solidFill>
+                          <a:srgbClr val="000000"/>
+                        </a:solidFill>
+                        <a:effectLst/>
+                        <a:latin typeface="+mn-lt"/>
+                      </a:endParaRPr>
+                    </a:p>
+                  </a:txBody>
+                  <a:tcPr marL="5001" marR="5001" marT="5001" marB="0" anchor="b">
+                    <a:lnL w="6350" cap="flat" cmpd="sng" algn="ctr">
+                      <a:solidFill>
+                        <a:srgbClr val="000000"/>
+                      </a:solidFill>
+                      <a:prstDash val="solid"/>
+                      <a:round/>
+                      <a:headEnd type="none" w="med" len="med"/>
+                      <a:tailEnd type="none" w="med" len="med"/>
+                    </a:lnL>
+                    <a:lnR w="6350" cap="flat" cmpd="sng" algn="ctr">
+                      <a:solidFill>
+                        <a:srgbClr val="000000"/>
+                      </a:solidFill>
+                      <a:prstDash val="solid"/>
+                      <a:round/>
+                      <a:headEnd type="none" w="med" len="med"/>
+                      <a:tailEnd type="none" w="med" len="med"/>
+                    </a:lnR>
+                    <a:lnT w="6350" cap="flat" cmpd="sng" algn="ctr">
+                      <a:solidFill>
+                        <a:srgbClr val="000000"/>
+                      </a:solidFill>
+                      <a:prstDash val="solid"/>
+                      <a:round/>
+                      <a:headEnd type="none" w="med" len="med"/>
+                      <a:tailEnd type="none" w="med" len="med"/>
+                    </a:lnT>
+                    <a:lnB w="6350" cap="flat" cmpd="sng" algn="ctr">
+                      <a:solidFill>
+                        <a:srgbClr val="000000"/>
+                      </a:solidFill>
+                      <a:prstDash val="solid"/>
+                      <a:round/>
+                      <a:headEnd type="none" w="med" len="med"/>
+                      <a:tailEnd type="none" w="med" len="med"/>
+                    </a:lnB>
+                    <a:solidFill>
+                      <a:srgbClr val="AEFDA1"/>
                     </a:solidFill>
                   </a:tcPr>
                 </a:tc>
@@ -4369,7 +4652,7 @@
                       <a:tailEnd type="none" w="med" len="med"/>
                     </a:lnB>
                     <a:solidFill>
-                      <a:srgbClr val="E2EFDA"/>
+                      <a:srgbClr val="AAFCB2"/>
                     </a:solidFill>
                   </a:tcPr>
                 </a:tc>
@@ -4401,7 +4684,7 @@
                       </a:r>
                     </a:p>
                   </a:txBody>
-                  <a:tcPr marL="5001" marR="5001" marT="5001" marB="0" anchor="b">
+                  <a:tcPr marL="5001" marR="5001" marT="5001" marB="0" anchor="ctr" anchorCtr="1">
                     <a:lnL w="6350" cap="flat" cmpd="sng" algn="ctr">
                       <a:solidFill>
                         <a:srgbClr val="000000"/>
@@ -4439,7 +4722,7 @@
                       <a:tailEnd type="none" w="med" len="med"/>
                     </a:lnB>
                     <a:solidFill>
-                      <a:srgbClr val="E2EFDA"/>
+                      <a:srgbClr val="AAFCB2"/>
                     </a:solidFill>
                   </a:tcPr>
                 </a:tc>
@@ -4461,7 +4744,7 @@
                       </a:r>
                     </a:p>
                   </a:txBody>
-                  <a:tcPr marL="5001" marR="5001" marT="5001" marB="0" anchor="b">
+                  <a:tcPr marL="5001" marR="5001" marT="5001" marB="0" anchor="ctr" anchorCtr="1">
                     <a:lnL w="6350" cap="flat" cmpd="sng" algn="ctr">
                       <a:solidFill>
                         <a:srgbClr val="000000"/>
@@ -4499,7 +4782,7 @@
                       <a:tailEnd type="none" w="med" len="med"/>
                     </a:lnB>
                     <a:solidFill>
-                      <a:srgbClr val="E2EFDA"/>
+                      <a:srgbClr val="AAFCB2"/>
                     </a:solidFill>
                   </a:tcPr>
                 </a:tc>
@@ -4521,7 +4804,7 @@
                       </a:r>
                     </a:p>
                   </a:txBody>
-                  <a:tcPr marL="5001" marR="5001" marT="5001" marB="0" anchor="b">
+                  <a:tcPr marL="5001" marR="5001" marT="5001" marB="0" anchor="ctr" anchorCtr="1">
                     <a:lnL w="6350" cap="flat" cmpd="sng" algn="ctr">
                       <a:solidFill>
                         <a:srgbClr val="000000"/>
@@ -4559,7 +4842,7 @@
                       <a:tailEnd type="none" w="med" len="med"/>
                     </a:lnB>
                     <a:solidFill>
-                      <a:srgbClr val="E2EFDA"/>
+                      <a:srgbClr val="AAFCB2"/>
                     </a:solidFill>
                   </a:tcPr>
                 </a:tc>
@@ -4581,7 +4864,7 @@
                       </a:r>
                     </a:p>
                   </a:txBody>
-                  <a:tcPr marL="5001" marR="5001" marT="5001" marB="0" anchor="b">
+                  <a:tcPr marL="5001" marR="5001" marT="5001" marB="0" anchor="ctr" anchorCtr="1">
                     <a:lnL w="6350" cap="flat" cmpd="sng" algn="ctr">
                       <a:solidFill>
                         <a:srgbClr val="000000"/>
@@ -4619,7 +4902,7 @@
                       <a:tailEnd type="none" w="med" len="med"/>
                     </a:lnB>
                     <a:solidFill>
-                      <a:srgbClr val="E2EFDA"/>
+                      <a:srgbClr val="AAFCB2"/>
                     </a:solidFill>
                   </a:tcPr>
                 </a:tc>
@@ -4641,7 +4924,7 @@
                       </a:r>
                     </a:p>
                   </a:txBody>
-                  <a:tcPr marL="5001" marR="5001" marT="5001" marB="0" anchor="b">
+                  <a:tcPr marL="5001" marR="5001" marT="5001" marB="0" anchor="ctr" anchorCtr="1">
                     <a:lnL w="6350" cap="flat" cmpd="sng" algn="ctr">
                       <a:solidFill>
                         <a:srgbClr val="000000"/>
@@ -4679,7 +4962,7 @@
                       <a:tailEnd type="none" w="med" len="med"/>
                     </a:lnB>
                     <a:solidFill>
-                      <a:srgbClr val="E2EFDA"/>
+                      <a:srgbClr val="AAFCB2"/>
                     </a:solidFill>
                   </a:tcPr>
                 </a:tc>
@@ -4701,7 +4984,7 @@
                       </a:r>
                     </a:p>
                   </a:txBody>
-                  <a:tcPr marL="5001" marR="5001" marT="5001" marB="0" anchor="b">
+                  <a:tcPr marL="5001" marR="5001" marT="5001" marB="0" anchor="ctr" anchorCtr="1">
                     <a:lnL w="6350" cap="flat" cmpd="sng" algn="ctr">
                       <a:solidFill>
                         <a:srgbClr val="000000"/>
@@ -4739,7 +5022,7 @@
                       <a:tailEnd type="none" w="med" len="med"/>
                     </a:lnB>
                     <a:solidFill>
-                      <a:srgbClr val="E2EFDA"/>
+                      <a:srgbClr val="AAFCB2"/>
                     </a:solidFill>
                   </a:tcPr>
                 </a:tc>
@@ -4761,7 +5044,7 @@
                       </a:r>
                     </a:p>
                   </a:txBody>
-                  <a:tcPr marL="5001" marR="5001" marT="5001" marB="0" anchor="b">
+                  <a:tcPr marL="5001" marR="5001" marT="5001" marB="0" anchor="ctr" anchorCtr="1">
                     <a:lnL w="6350" cap="flat" cmpd="sng" algn="ctr">
                       <a:solidFill>
                         <a:srgbClr val="000000"/>
@@ -4799,11 +5082,11 @@
                       <a:tailEnd type="none" w="med" len="med"/>
                     </a:lnB>
                     <a:solidFill>
-                      <a:srgbClr val="E2EFDA"/>
+                      <a:srgbClr val="AAFCB2"/>
                     </a:solidFill>
                   </a:tcPr>
                 </a:tc>
-                <a:tc gridSpan="3">
+                <a:tc gridSpan="2">
                   <a:txBody>
                     <a:bodyPr/>
                     <a:lstStyle/>
@@ -4821,7 +5104,7 @@
                       </a:r>
                     </a:p>
                   </a:txBody>
-                  <a:tcPr marL="5001" marR="5001" marT="5001" marB="0" anchor="b">
+                  <a:tcPr marL="5001" marR="5001" marT="5001" marB="0" anchor="ctr" anchorCtr="1">
                     <a:lnL w="19050" cap="flat" cmpd="sng" algn="ctr">
                       <a:solidFill>
                         <a:schemeClr val="tx1"/>
@@ -4859,19 +5142,9 @@
                       <a:tailEnd type="none" w="med" len="med"/>
                     </a:lnB>
                     <a:solidFill>
-                      <a:srgbClr val="E2EFDA"/>
+                      <a:srgbClr val="AEFDA1"/>
                     </a:solidFill>
                   </a:tcPr>
-                </a:tc>
-                <a:tc hMerge="1">
-                  <a:txBody>
-                    <a:bodyPr/>
-                    <a:lstStyle/>
-                    <a:p>
-                      <a:endParaRPr lang="en-US"/>
-                    </a:p>
-                  </a:txBody>
-                  <a:tcPr/>
                 </a:tc>
                 <a:tc hMerge="1">
                   <a:txBody>
@@ -4901,6 +5174,63 @@
                       </a:r>
                     </a:p>
                   </a:txBody>
+                  <a:tcPr marL="5001" marR="5001" marT="5001" marB="0" anchor="ctr" anchorCtr="1">
+                    <a:lnL w="6350" cap="flat" cmpd="sng" algn="ctr">
+                      <a:solidFill>
+                        <a:srgbClr val="000000"/>
+                      </a:solidFill>
+                      <a:prstDash val="solid"/>
+                      <a:round/>
+                      <a:headEnd type="none" w="med" len="med"/>
+                      <a:tailEnd type="none" w="med" len="med"/>
+                    </a:lnL>
+                    <a:lnR w="6350" cap="flat" cmpd="sng" algn="ctr">
+                      <a:solidFill>
+                        <a:srgbClr val="000000"/>
+                      </a:solidFill>
+                      <a:prstDash val="solid"/>
+                      <a:round/>
+                      <a:headEnd type="none" w="med" len="med"/>
+                      <a:tailEnd type="none" w="med" len="med"/>
+                    </a:lnR>
+                    <a:lnT w="6350" cap="flat" cmpd="sng" algn="ctr">
+                      <a:solidFill>
+                        <a:srgbClr val="000000"/>
+                      </a:solidFill>
+                      <a:prstDash val="solid"/>
+                      <a:round/>
+                      <a:headEnd type="none" w="med" len="med"/>
+                      <a:tailEnd type="none" w="med" len="med"/>
+                    </a:lnT>
+                    <a:lnB w="19050" cap="flat" cmpd="sng" algn="ctr">
+                      <a:solidFill>
+                        <a:schemeClr val="tx1"/>
+                      </a:solidFill>
+                      <a:prstDash val="solid"/>
+                      <a:round/>
+                      <a:headEnd type="none" w="med" len="med"/>
+                      <a:tailEnd type="none" w="med" len="med"/>
+                    </a:lnB>
+                    <a:solidFill>
+                      <a:srgbClr val="AEFDA1"/>
+                    </a:solidFill>
+                  </a:tcPr>
+                </a:tc>
+                <a:tc hMerge="1">
+                  <a:txBody>
+                    <a:bodyPr/>
+                    <a:lstStyle/>
+                    <a:p>
+                      <a:pPr algn="ctr" fontAlgn="b"/>
+                      <a:endParaRPr lang="en-US" sz="1000" b="0" i="0" u="none" strike="noStrike" dirty="0">
+                        <a:solidFill>
+                          <a:srgbClr val="000000"/>
+                        </a:solidFill>
+                        <a:effectLst/>
+                        <a:latin typeface="+mn-lt"/>
+                      </a:endParaRPr>
+                    </a:p>
+                  </a:txBody>
                   <a:tcPr marL="5001" marR="5001" marT="5001" marB="0" anchor="b">
                     <a:lnL w="6350" cap="flat" cmpd="sng" algn="ctr">
                       <a:solidFill>
@@ -4939,21 +5269,11 @@
                       <a:tailEnd type="none" w="med" len="med"/>
                     </a:lnB>
                     <a:solidFill>
-                      <a:srgbClr val="E2EFDA"/>
+                      <a:srgbClr val="AEFDA1"/>
                     </a:solidFill>
                   </a:tcPr>
                 </a:tc>
-                <a:tc hMerge="1">
-                  <a:txBody>
-                    <a:bodyPr/>
-                    <a:lstStyle/>
-                    <a:p>
-                      <a:endParaRPr lang="en-US"/>
-                    </a:p>
-                  </a:txBody>
-                  <a:tcPr/>
-                </a:tc>
-                <a:tc>
+                <a:tc gridSpan="2">
                   <a:txBody>
                     <a:bodyPr/>
                     <a:lstStyle/>
@@ -4971,6 +5291,63 @@
                       </a:r>
                     </a:p>
                   </a:txBody>
+                  <a:tcPr marL="5001" marR="5001" marT="5001" marB="0" anchor="ctr" anchorCtr="1">
+                    <a:lnL w="6350" cap="flat" cmpd="sng" algn="ctr">
+                      <a:solidFill>
+                        <a:srgbClr val="000000"/>
+                      </a:solidFill>
+                      <a:prstDash val="solid"/>
+                      <a:round/>
+                      <a:headEnd type="none" w="med" len="med"/>
+                      <a:tailEnd type="none" w="med" len="med"/>
+                    </a:lnL>
+                    <a:lnR w="6350" cap="flat" cmpd="sng" algn="ctr">
+                      <a:solidFill>
+                        <a:srgbClr val="000000"/>
+                      </a:solidFill>
+                      <a:prstDash val="solid"/>
+                      <a:round/>
+                      <a:headEnd type="none" w="med" len="med"/>
+                      <a:tailEnd type="none" w="med" len="med"/>
+                    </a:lnR>
+                    <a:lnT w="6350" cap="flat" cmpd="sng" algn="ctr">
+                      <a:solidFill>
+                        <a:srgbClr val="000000"/>
+                      </a:solidFill>
+                      <a:prstDash val="solid"/>
+                      <a:round/>
+                      <a:headEnd type="none" w="med" len="med"/>
+                      <a:tailEnd type="none" w="med" len="med"/>
+                    </a:lnT>
+                    <a:lnB w="19050" cap="flat" cmpd="sng" algn="ctr">
+                      <a:solidFill>
+                        <a:schemeClr val="tx1"/>
+                      </a:solidFill>
+                      <a:prstDash val="solid"/>
+                      <a:round/>
+                      <a:headEnd type="none" w="med" len="med"/>
+                      <a:tailEnd type="none" w="med" len="med"/>
+                    </a:lnB>
+                    <a:solidFill>
+                      <a:srgbClr val="AEFDA1"/>
+                    </a:solidFill>
+                  </a:tcPr>
+                </a:tc>
+                <a:tc hMerge="1">
+                  <a:txBody>
+                    <a:bodyPr/>
+                    <a:lstStyle/>
+                    <a:p>
+                      <a:pPr algn="ctr" fontAlgn="b"/>
+                      <a:endParaRPr lang="en-US" sz="1000" b="0" i="0" u="none" strike="noStrike" dirty="0">
+                        <a:solidFill>
+                          <a:srgbClr val="000000"/>
+                        </a:solidFill>
+                        <a:effectLst/>
+                        <a:latin typeface="+mn-lt"/>
+                      </a:endParaRPr>
+                    </a:p>
+                  </a:txBody>
                   <a:tcPr marL="5001" marR="5001" marT="5001" marB="0" anchor="b">
                     <a:lnL w="6350" cap="flat" cmpd="sng" algn="ctr">
                       <a:solidFill>
@@ -5009,11 +5386,11 @@
                       <a:tailEnd type="none" w="med" len="med"/>
                     </a:lnB>
                     <a:solidFill>
-                      <a:srgbClr val="E2EFDA"/>
+                      <a:srgbClr val="AEFDA1"/>
                     </a:solidFill>
                   </a:tcPr>
                 </a:tc>
-                <a:tc>
+                <a:tc gridSpan="2">
                   <a:txBody>
                     <a:bodyPr/>
                     <a:lstStyle/>
@@ -5031,6 +5408,63 @@
                       </a:r>
                     </a:p>
                   </a:txBody>
+                  <a:tcPr marL="5001" marR="5001" marT="5001" marB="0" anchor="ctr" anchorCtr="1">
+                    <a:lnL w="6350" cap="flat" cmpd="sng" algn="ctr">
+                      <a:solidFill>
+                        <a:srgbClr val="000000"/>
+                      </a:solidFill>
+                      <a:prstDash val="solid"/>
+                      <a:round/>
+                      <a:headEnd type="none" w="med" len="med"/>
+                      <a:tailEnd type="none" w="med" len="med"/>
+                    </a:lnL>
+                    <a:lnR w="6350" cap="flat" cmpd="sng" algn="ctr">
+                      <a:solidFill>
+                        <a:srgbClr val="000000"/>
+                      </a:solidFill>
+                      <a:prstDash val="solid"/>
+                      <a:round/>
+                      <a:headEnd type="none" w="med" len="med"/>
+                      <a:tailEnd type="none" w="med" len="med"/>
+                    </a:lnR>
+                    <a:lnT w="6350" cap="flat" cmpd="sng" algn="ctr">
+                      <a:solidFill>
+                        <a:srgbClr val="000000"/>
+                      </a:solidFill>
+                      <a:prstDash val="solid"/>
+                      <a:round/>
+                      <a:headEnd type="none" w="med" len="med"/>
+                      <a:tailEnd type="none" w="med" len="med"/>
+                    </a:lnT>
+                    <a:lnB w="19050" cap="flat" cmpd="sng" algn="ctr">
+                      <a:solidFill>
+                        <a:schemeClr val="tx1"/>
+                      </a:solidFill>
+                      <a:prstDash val="solid"/>
+                      <a:round/>
+                      <a:headEnd type="none" w="med" len="med"/>
+                      <a:tailEnd type="none" w="med" len="med"/>
+                    </a:lnB>
+                    <a:solidFill>
+                      <a:srgbClr val="AEFDA1"/>
+                    </a:solidFill>
+                  </a:tcPr>
+                </a:tc>
+                <a:tc hMerge="1">
+                  <a:txBody>
+                    <a:bodyPr/>
+                    <a:lstStyle/>
+                    <a:p>
+                      <a:pPr algn="ctr" fontAlgn="b"/>
+                      <a:endParaRPr lang="en-US" sz="1000" b="0" i="0" u="none" strike="noStrike" dirty="0">
+                        <a:solidFill>
+                          <a:srgbClr val="000000"/>
+                        </a:solidFill>
+                        <a:effectLst/>
+                        <a:latin typeface="+mn-lt"/>
+                      </a:endParaRPr>
+                    </a:p>
+                  </a:txBody>
                   <a:tcPr marL="5001" marR="5001" marT="5001" marB="0" anchor="b">
                     <a:lnL w="6350" cap="flat" cmpd="sng" algn="ctr">
                       <a:solidFill>
@@ -5069,7 +5503,7 @@
                       <a:tailEnd type="none" w="med" len="med"/>
                     </a:lnB>
                     <a:solidFill>
-                      <a:srgbClr val="E2EFDA"/>
+                      <a:srgbClr val="AEFDA1"/>
                     </a:solidFill>
                   </a:tcPr>
                 </a:tc>
@@ -5091,7 +5525,7 @@
                       </a:r>
                     </a:p>
                   </a:txBody>
-                  <a:tcPr marL="5001" marR="5001" marT="5001" marB="0" anchor="b">
+                  <a:tcPr marL="5001" marR="5001" marT="5001" marB="0" anchor="ctr" anchorCtr="1">
                     <a:lnL w="6350" cap="flat" cmpd="sng" algn="ctr">
                       <a:solidFill>
                         <a:srgbClr val="000000"/>
@@ -5129,7 +5563,7 @@
                       <a:tailEnd type="none" w="med" len="med"/>
                     </a:lnB>
                     <a:solidFill>
-                      <a:srgbClr val="E2EFDA"/>
+                      <a:srgbClr val="AEFDA1"/>
                     </a:solidFill>
                   </a:tcPr>
                 </a:tc>
@@ -5158,6 +5592,63 @@
                       <a:headEnd type="none" w="med" len="med"/>
                       <a:tailEnd type="none" w="med" len="med"/>
                     </a:lnL>
+                    <a:lnR w="6350" cap="flat" cmpd="sng" algn="ctr">
+                      <a:solidFill>
+                        <a:srgbClr val="000000"/>
+                      </a:solidFill>
+                      <a:prstDash val="solid"/>
+                      <a:round/>
+                      <a:headEnd type="none" w="med" len="med"/>
+                      <a:tailEnd type="none" w="med" len="med"/>
+                    </a:lnR>
+                    <a:lnT w="6350" cap="flat" cmpd="sng" algn="ctr">
+                      <a:solidFill>
+                        <a:srgbClr val="000000"/>
+                      </a:solidFill>
+                      <a:prstDash val="solid"/>
+                      <a:round/>
+                      <a:headEnd type="none" w="med" len="med"/>
+                      <a:tailEnd type="none" w="med" len="med"/>
+                    </a:lnT>
+                    <a:lnB w="19050" cap="flat" cmpd="sng" algn="ctr">
+                      <a:solidFill>
+                        <a:schemeClr val="tx1"/>
+                      </a:solidFill>
+                      <a:prstDash val="solid"/>
+                      <a:round/>
+                      <a:headEnd type="none" w="med" len="med"/>
+                      <a:tailEnd type="none" w="med" len="med"/>
+                    </a:lnB>
+                    <a:solidFill>
+                      <a:srgbClr val="AEFDA1"/>
+                    </a:solidFill>
+                  </a:tcPr>
+                </a:tc>
+                <a:tc vMerge="1">
+                  <a:txBody>
+                    <a:bodyPr/>
+                    <a:lstStyle/>
+                    <a:p>
+                      <a:pPr algn="ctr" fontAlgn="b"/>
+                      <a:endParaRPr lang="en-US" sz="1000" b="0" i="0" u="none" strike="noStrike" dirty="0">
+                        <a:solidFill>
+                          <a:srgbClr val="000000"/>
+                        </a:solidFill>
+                        <a:effectLst/>
+                        <a:latin typeface="+mn-lt"/>
+                      </a:endParaRPr>
+                    </a:p>
+                  </a:txBody>
+                  <a:tcPr marL="5001" marR="5001" marT="5001" marB="0" anchor="b">
+                    <a:lnL w="6350" cap="flat" cmpd="sng" algn="ctr">
+                      <a:solidFill>
+                        <a:srgbClr val="000000"/>
+                      </a:solidFill>
+                      <a:prstDash val="solid"/>
+                      <a:round/>
+                      <a:headEnd type="none" w="med" len="med"/>
+                      <a:tailEnd type="none" w="med" len="med"/>
+                    </a:lnL>
                     <a:lnR w="19050" cap="flat" cmpd="sng" algn="ctr">
                       <a:solidFill>
                         <a:schemeClr val="tx1"/>
@@ -5200,45 +5691,62 @@
                 </a:extLst>
               </a:tr>
               <a:tr h="382142">
-                <a:tc gridSpan="17">
-                  <a:txBody>
-                    <a:bodyPr/>
-                    <a:lstStyle/>
-                    <a:p>
-                      <a:pPr algn="ctr" fontAlgn="b"/>
+                <a:tc gridSpan="18">
+                  <a:txBody>
+                    <a:bodyPr/>
+                    <a:lstStyle/>
+                    <a:p>
+                      <a:pPr marL="0" marR="0" lvl="0" indent="0" algn="ctr" defTabSz="914400" rtl="0" eaLnBrk="1" fontAlgn="b" latinLnBrk="0" hangingPunct="1">
+                        <a:lnSpc>
+                          <a:spcPct val="100000"/>
+                        </a:lnSpc>
+                        <a:spcBef>
+                          <a:spcPts val="0"/>
+                        </a:spcBef>
+                        <a:spcAft>
+                          <a:spcPts val="0"/>
+                        </a:spcAft>
+                        <a:buClrTx/>
+                        <a:buSzTx/>
+                        <a:buFontTx/>
+                        <a:buNone/>
+                        <a:tabLst/>
+                        <a:defRPr/>
+                      </a:pPr>
                       <a:r>
-                        <a:rPr lang="en-US" sz="1600" b="0" i="0" u="none" strike="noStrike" dirty="0">
+                        <a:rPr kumimoji="0" lang="en-US" sz="1800" b="1" i="1" u="none" strike="noStrike" kern="1200" cap="none" spc="0" normalizeH="0" baseline="0" noProof="0" dirty="0" smtClean="0">
+                          <a:ln>
+                            <a:noFill/>
+                          </a:ln>
                           <a:solidFill>
                             <a:srgbClr val="000000"/>
                           </a:solidFill>
                           <a:effectLst/>
+                          <a:uLnTx/>
+                          <a:uFillTx/>
                           <a:latin typeface="+mn-lt"/>
+                          <a:ea typeface="+mn-ea"/>
+                          <a:cs typeface="+mn-cs"/>
                         </a:rPr>
-                        <a:t>Document project</a:t>
+                        <a:t>Document – develop study plan, protocols, SOPs &amp; maintain project record</a:t>
                       </a:r>
-                      <a:r>
-                        <a:rPr lang="en-US" sz="1600" b="0" i="0" u="none" strike="noStrike" baseline="0" dirty="0">
-                          <a:solidFill>
-                            <a:srgbClr val="000000"/>
-                          </a:solidFill>
-                          <a:effectLst/>
-                          <a:latin typeface="+mn-lt"/>
-                        </a:rPr>
-                        <a:t> – project record, study plan, protocols, SOPs</a:t>
-                      </a:r>
-                      <a:r>
-                        <a:rPr lang="en-US" sz="1600" b="0" i="0" u="none" strike="noStrike" dirty="0">
-                          <a:solidFill>
-                            <a:srgbClr val="000000"/>
-                          </a:solidFill>
-                          <a:effectLst/>
-                          <a:latin typeface="+mn-lt"/>
-                        </a:rPr>
-                        <a:t> </a:t>
-                      </a:r>
-                    </a:p>
-                  </a:txBody>
-                  <a:tcPr marL="5001" marR="5001" marT="5001" marB="0" anchor="b">
+                      <a:endParaRPr kumimoji="0" lang="en-US" sz="1800" b="1" i="1" u="none" strike="noStrike" kern="1200" cap="none" spc="0" normalizeH="0" baseline="0" noProof="0" dirty="0">
+                        <a:ln>
+                          <a:noFill/>
+                        </a:ln>
+                        <a:solidFill>
+                          <a:srgbClr val="000000"/>
+                        </a:solidFill>
+                        <a:effectLst/>
+                        <a:uLnTx/>
+                        <a:uFillTx/>
+                        <a:latin typeface="+mn-lt"/>
+                        <a:ea typeface="+mn-ea"/>
+                        <a:cs typeface="+mn-cs"/>
+                      </a:endParaRPr>
+                    </a:p>
+                  </a:txBody>
+                  <a:tcPr marL="5001" marR="5001" marT="5001" marB="0" anchor="ctr">
                     <a:lnL w="19050" cap="flat" cmpd="sng" algn="ctr">
                       <a:solidFill>
                         <a:schemeClr val="tx1"/>
@@ -5276,9 +5784,29 @@
                       <a:tailEnd type="none" w="med" len="med"/>
                     </a:lnB>
                     <a:solidFill>
-                      <a:srgbClr val="E2EFDA"/>
+                      <a:srgbClr val="D2FEDC"/>
                     </a:solidFill>
                   </a:tcPr>
+                </a:tc>
+                <a:tc hMerge="1">
+                  <a:txBody>
+                    <a:bodyPr/>
+                    <a:lstStyle/>
+                    <a:p>
+                      <a:endParaRPr lang="en-US"/>
+                    </a:p>
+                  </a:txBody>
+                  <a:tcPr/>
+                </a:tc>
+                <a:tc hMerge="1">
+                  <a:txBody>
+                    <a:bodyPr/>
+                    <a:lstStyle/>
+                    <a:p>
+                      <a:endParaRPr lang="en-US"/>
+                    </a:p>
+                  </a:txBody>
+                  <a:tcPr/>
                 </a:tc>
                 <a:tc hMerge="1">
                   <a:txBody>
@@ -5477,15 +6005,55 @@
                   </a:txBody>
                   <a:tcPr/>
                 </a:tc>
-                <a:tc hMerge="1">
-                  <a:txBody>
-                    <a:bodyPr/>
-                    <a:lstStyle/>
-                    <a:p>
-                      <a:endParaRPr lang="en-US"/>
-                    </a:p>
-                  </a:txBody>
-                  <a:tcPr/>
+                <a:tc vMerge="1">
+                  <a:txBody>
+                    <a:bodyPr/>
+                    <a:lstStyle/>
+                    <a:p>
+                      <a:endParaRPr lang="en-US" dirty="0"/>
+                    </a:p>
+                  </a:txBody>
+                  <a:tcPr marL="5001" marR="5001" marT="5001" marB="0" anchor="ctr">
+                    <a:lnL w="6350" cap="flat" cmpd="sng" algn="ctr">
+                      <a:solidFill>
+                        <a:srgbClr val="000000"/>
+                      </a:solidFill>
+                      <a:prstDash val="solid"/>
+                      <a:round/>
+                      <a:headEnd type="none" w="med" len="med"/>
+                      <a:tailEnd type="none" w="med" len="med"/>
+                    </a:lnL>
+                    <a:lnR w="6350" cap="flat" cmpd="sng" algn="ctr">
+                      <a:solidFill>
+                        <a:srgbClr val="000000"/>
+                      </a:solidFill>
+                      <a:prstDash val="solid"/>
+                      <a:round/>
+                      <a:headEnd type="none" w="med" len="med"/>
+                      <a:tailEnd type="none" w="med" len="med"/>
+                    </a:lnR>
+                    <a:lnT w="19050" cap="flat" cmpd="sng" algn="ctr">
+                      <a:solidFill>
+                        <a:schemeClr val="tx1"/>
+                      </a:solidFill>
+                      <a:prstDash val="solid"/>
+                      <a:round/>
+                      <a:headEnd type="none" w="med" len="med"/>
+                      <a:tailEnd type="none" w="med" len="med"/>
+                    </a:lnT>
+                    <a:lnB w="19050" cap="flat" cmpd="sng" algn="ctr">
+                      <a:solidFill>
+                        <a:schemeClr val="tx1"/>
+                      </a:solidFill>
+                      <a:prstDash val="solid"/>
+                      <a:round/>
+                      <a:headEnd type="none" w="med" len="med"/>
+                      <a:tailEnd type="none" w="med" len="med"/>
+                    </a:lnB>
+                    <a:solidFill>
+                      <a:srgbClr val="D2FEDC"/>
+                    </a:solidFill>
+                  </a:tcPr>
                 </a:tc>
                 <a:tc vMerge="1">
                   <a:txBody>
@@ -5727,10 +6295,7 @@
                       <a:tailEnd type="none" w="med" len="med"/>
                     </a:lnB>
                     <a:solidFill>
-                      <a:schemeClr val="accent1">
-                        <a:lumMod val="20000"/>
-                        <a:lumOff val="80000"/>
-                      </a:schemeClr>
+                      <a:schemeClr val="tx1"/>
                     </a:solidFill>
                   </a:tcPr>
                 </a:tc>
@@ -5781,7 +6346,7 @@
                     </a:solidFill>
                   </a:tcPr>
                 </a:tc>
-                <a:tc gridSpan="15">
+                <a:tc gridSpan="17">
                   <a:txBody>
                     <a:bodyPr/>
                     <a:lstStyle/>
@@ -5795,8 +6360,25 @@
                           <a:effectLst/>
                           <a:latin typeface="+mn-lt"/>
                         </a:rPr>
-                        <a:t>Data Management Life Cycle*</a:t>
+                        <a:t>Data Management Life </a:t>
                       </a:r>
+                      <a:r>
+                        <a:rPr lang="en-US" sz="2800" b="1" i="0" u="none" strike="noStrike" dirty="0" smtClean="0">
+                          <a:solidFill>
+                            <a:srgbClr val="000000"/>
+                          </a:solidFill>
+                          <a:effectLst/>
+                          <a:latin typeface="+mn-lt"/>
+                        </a:rPr>
+                        <a:t>Cycle</a:t>
+                      </a:r>
+                      <a:endParaRPr lang="en-US" sz="2800" b="1" i="0" u="none" strike="noStrike" dirty="0">
+                        <a:solidFill>
+                          <a:srgbClr val="000000"/>
+                        </a:solidFill>
+                        <a:effectLst/>
+                        <a:latin typeface="+mn-lt"/>
+                      </a:endParaRPr>
                     </a:p>
                   </a:txBody>
                   <a:tcPr marL="5001" marR="5001" marT="5001" marB="0" anchor="b">
@@ -5837,12 +6419,29 @@
                       <a:tailEnd type="none" w="med" len="med"/>
                     </a:lnB>
                     <a:solidFill>
-                      <a:schemeClr val="accent1">
-                        <a:lumMod val="60000"/>
-                        <a:lumOff val="40000"/>
-                      </a:schemeClr>
+                      <a:srgbClr val="4A9FEC"/>
                     </a:solidFill>
                   </a:tcPr>
+                </a:tc>
+                <a:tc hMerge="1">
+                  <a:txBody>
+                    <a:bodyPr/>
+                    <a:lstStyle/>
+                    <a:p>
+                      <a:endParaRPr lang="en-US"/>
+                    </a:p>
+                  </a:txBody>
+                  <a:tcPr/>
+                </a:tc>
+                <a:tc hMerge="1">
+                  <a:txBody>
+                    <a:bodyPr/>
+                    <a:lstStyle/>
+                    <a:p>
+                      <a:endParaRPr lang="en-US"/>
+                    </a:p>
+                  </a:txBody>
+                  <a:tcPr/>
                 </a:tc>
                 <a:tc hMerge="1">
                   <a:txBody>
@@ -6189,7 +6788,7 @@
                       <a:tailEnd type="none" w="med" len="med"/>
                     </a:lnB>
                     <a:solidFill>
-                      <a:srgbClr val="DDEBF7"/>
+                      <a:srgbClr val="A0E8FE"/>
                     </a:solidFill>
                   </a:tcPr>
                 </a:tc>
@@ -6253,7 +6852,7 @@
                   </a:txBody>
                   <a:tcPr/>
                 </a:tc>
-                <a:tc gridSpan="8">
+                <a:tc gridSpan="10">
                   <a:txBody>
                     <a:bodyPr/>
                     <a:lstStyle/>
@@ -6309,9 +6908,29 @@
                       <a:tailEnd type="none" w="med" len="med"/>
                     </a:lnB>
                     <a:solidFill>
-                      <a:srgbClr val="DDEBF7"/>
+                      <a:srgbClr val="A7D5FF"/>
                     </a:solidFill>
                   </a:tcPr>
+                </a:tc>
+                <a:tc hMerge="1">
+                  <a:txBody>
+                    <a:bodyPr/>
+                    <a:lstStyle/>
+                    <a:p>
+                      <a:endParaRPr lang="en-US"/>
+                    </a:p>
+                  </a:txBody>
+                  <a:tcPr/>
+                </a:tc>
+                <a:tc hMerge="1">
+                  <a:txBody>
+                    <a:bodyPr/>
+                    <a:lstStyle/>
+                    <a:p>
+                      <a:endParaRPr lang="en-US"/>
+                    </a:p>
+                  </a:txBody>
+                  <a:tcPr/>
                 </a:tc>
                 <a:tc hMerge="1">
                   <a:txBody>
@@ -6605,10 +7224,7 @@
                       <a:tailEnd type="none" w="med" len="med"/>
                     </a:lnB>
                     <a:solidFill>
-                      <a:schemeClr val="accent1">
-                        <a:lumMod val="60000"/>
-                        <a:lumOff val="40000"/>
-                      </a:schemeClr>
+                      <a:srgbClr val="A0E8FE"/>
                     </a:solidFill>
                   </a:tcPr>
                 </a:tc>
@@ -6668,10 +7284,7 @@
                       <a:tailEnd type="none" w="med" len="med"/>
                     </a:lnB>
                     <a:solidFill>
-                      <a:schemeClr val="accent1">
-                        <a:lumMod val="60000"/>
-                        <a:lumOff val="40000"/>
-                      </a:schemeClr>
+                      <a:srgbClr val="A0E8FE"/>
                     </a:solidFill>
                   </a:tcPr>
                 </a:tc>
@@ -6731,10 +7344,7 @@
                       <a:tailEnd type="none" w="med" len="med"/>
                     </a:lnB>
                     <a:solidFill>
-                      <a:schemeClr val="accent1">
-                        <a:lumMod val="60000"/>
-                        <a:lumOff val="40000"/>
-                      </a:schemeClr>
+                      <a:srgbClr val="A0E8FE"/>
                     </a:solidFill>
                   </a:tcPr>
                 </a:tc>
@@ -6794,10 +7404,7 @@
                       <a:tailEnd type="none" w="med" len="med"/>
                     </a:lnB>
                     <a:solidFill>
-                      <a:schemeClr val="accent1">
-                        <a:lumMod val="60000"/>
-                        <a:lumOff val="40000"/>
-                      </a:schemeClr>
+                      <a:srgbClr val="A0E8FE"/>
                     </a:solidFill>
                   </a:tcPr>
                 </a:tc>
@@ -6857,10 +7464,7 @@
                       <a:tailEnd type="none" w="med" len="med"/>
                     </a:lnB>
                     <a:solidFill>
-                      <a:schemeClr val="accent1">
-                        <a:lumMod val="60000"/>
-                        <a:lumOff val="40000"/>
-                      </a:schemeClr>
+                      <a:srgbClr val="A0E8FE"/>
                     </a:solidFill>
                   </a:tcPr>
                 </a:tc>
@@ -6920,10 +7524,7 @@
                       <a:tailEnd type="none" w="med" len="med"/>
                     </a:lnB>
                     <a:solidFill>
-                      <a:schemeClr val="accent1">
-                        <a:lumMod val="60000"/>
-                        <a:lumOff val="40000"/>
-                      </a:schemeClr>
+                      <a:srgbClr val="A0E8FE"/>
                     </a:solidFill>
                   </a:tcPr>
                 </a:tc>
@@ -6983,10 +7584,7 @@
                       <a:tailEnd type="none" w="med" len="med"/>
                     </a:lnB>
                     <a:solidFill>
-                      <a:schemeClr val="accent1">
-                        <a:lumMod val="60000"/>
-                        <a:lumOff val="40000"/>
-                      </a:schemeClr>
+                      <a:srgbClr val="A0E8FE"/>
                     </a:solidFill>
                   </a:tcPr>
                 </a:tc>
@@ -7046,10 +7644,7 @@
                       <a:tailEnd type="none" w="med" len="med"/>
                     </a:lnB>
                     <a:solidFill>
-                      <a:schemeClr val="accent1">
-                        <a:lumMod val="60000"/>
-                        <a:lumOff val="40000"/>
-                      </a:schemeClr>
+                      <a:srgbClr val="A7D5FF"/>
                     </a:solidFill>
                   </a:tcPr>
                 </a:tc>
@@ -7109,10 +7704,7 @@
                       <a:tailEnd type="none" w="med" len="med"/>
                     </a:lnB>
                     <a:solidFill>
-                      <a:schemeClr val="accent1">
-                        <a:lumMod val="60000"/>
-                        <a:lumOff val="40000"/>
-                      </a:schemeClr>
+                      <a:srgbClr val="A7D5FF"/>
                     </a:solidFill>
                   </a:tcPr>
                 </a:tc>
@@ -7172,14 +7764,11 @@
                       <a:tailEnd type="none" w="med" len="med"/>
                     </a:lnB>
                     <a:solidFill>
-                      <a:schemeClr val="accent1">
-                        <a:lumMod val="60000"/>
-                        <a:lumOff val="40000"/>
-                      </a:schemeClr>
+                      <a:srgbClr val="A7D5FF"/>
                     </a:solidFill>
                   </a:tcPr>
                 </a:tc>
-                <a:tc>
+                <a:tc gridSpan="2">
                   <a:txBody>
                     <a:bodyPr/>
                     <a:lstStyle/>
@@ -7235,14 +7824,21 @@
                       <a:tailEnd type="none" w="med" len="med"/>
                     </a:lnB>
                     <a:solidFill>
-                      <a:schemeClr val="accent1">
-                        <a:lumMod val="60000"/>
-                        <a:lumOff val="40000"/>
-                      </a:schemeClr>
+                      <a:srgbClr val="A7D5FF"/>
                     </a:solidFill>
                   </a:tcPr>
                 </a:tc>
-                <a:tc>
+                <a:tc hMerge="1">
+                  <a:txBody>
+                    <a:bodyPr/>
+                    <a:lstStyle/>
+                    <a:p>
+                      <a:endParaRPr lang="en-US"/>
+                    </a:p>
+                  </a:txBody>
+                  <a:tcPr/>
+                </a:tc>
+                <a:tc gridSpan="2">
                   <a:txBody>
                     <a:bodyPr/>
                     <a:lstStyle/>
@@ -7298,12 +7894,19 @@
                       <a:tailEnd type="none" w="med" len="med"/>
                     </a:lnB>
                     <a:solidFill>
-                      <a:schemeClr val="accent1">
-                        <a:lumMod val="60000"/>
-                        <a:lumOff val="40000"/>
-                      </a:schemeClr>
+                      <a:srgbClr val="A7D5FF"/>
                     </a:solidFill>
                   </a:tcPr>
+                </a:tc>
+                <a:tc hMerge="1">
+                  <a:txBody>
+                    <a:bodyPr/>
+                    <a:lstStyle/>
+                    <a:p>
+                      <a:endParaRPr lang="en-US"/>
+                    </a:p>
+                  </a:txBody>
+                  <a:tcPr/>
                 </a:tc>
                 <a:tc gridSpan="2">
                   <a:txBody>
@@ -7361,10 +7964,7 @@
                       <a:tailEnd type="none" w="med" len="med"/>
                     </a:lnB>
                     <a:solidFill>
-                      <a:schemeClr val="accent1">
-                        <a:lumMod val="60000"/>
-                        <a:lumOff val="40000"/>
-                      </a:schemeClr>
+                      <a:srgbClr val="A7D5FF"/>
                     </a:solidFill>
                   </a:tcPr>
                 </a:tc>
@@ -7385,7 +7985,7 @@
                     <a:p>
                       <a:pPr algn="ctr" fontAlgn="b"/>
                       <a:r>
-                        <a:rPr lang="en-US" sz="1300" b="1" i="0" u="none" strike="noStrike" dirty="0">
+                        <a:rPr lang="en-US" sz="1300" b="1" i="0" u="none" strike="noStrike" dirty="0" smtClean="0">
                           <a:solidFill>
                             <a:srgbClr val="000000"/>
                           </a:solidFill>
@@ -7394,6 +7994,13 @@
                         </a:rPr>
                         <a:t>Share</a:t>
                       </a:r>
+                      <a:endParaRPr lang="en-US" sz="1300" b="1" i="0" u="none" strike="noStrike" dirty="0">
+                        <a:solidFill>
+                          <a:srgbClr val="000000"/>
+                        </a:solidFill>
+                        <a:effectLst/>
+                        <a:latin typeface="+mn-lt"/>
+                      </a:endParaRPr>
                     </a:p>
                   </a:txBody>
                   <a:tcPr marL="5001" marR="5001" marT="5001" marB="0" anchor="b">
@@ -7434,10 +8041,7 @@
                       <a:tailEnd type="none" w="med" len="med"/>
                     </a:lnB>
                     <a:solidFill>
-                      <a:schemeClr val="accent1">
-                        <a:lumMod val="60000"/>
-                        <a:lumOff val="40000"/>
-                      </a:schemeClr>
+                      <a:srgbClr val="A7D5FF"/>
                     </a:solidFill>
                   </a:tcPr>
                 </a:tc>
@@ -7604,11 +8208,31 @@
                           <a:effectLst/>
                           <a:latin typeface="+mn-lt"/>
                         </a:rPr>
-                        <a:t>Assign data management roles &amp; responsibilities</a:t>
+                        <a:t>Assign </a:t>
                       </a:r>
-                    </a:p>
-                  </a:txBody>
-                  <a:tcPr marL="5001" marR="5001" marT="5001" marB="0" anchor="b">
+                      <a:r>
+                        <a:rPr lang="en-US" sz="1000" b="0" i="0" u="none" strike="noStrike" dirty="0" smtClean="0">
+                          <a:solidFill>
+                            <a:srgbClr val="000000"/>
+                          </a:solidFill>
+                          <a:effectLst/>
+                          <a:latin typeface="+mn-lt"/>
+                        </a:rPr>
+                        <a:t>roles </a:t>
+                      </a:r>
+                      <a:r>
+                        <a:rPr lang="en-US" sz="1000" b="0" i="0" u="none" strike="noStrike" dirty="0">
+                          <a:solidFill>
+                            <a:srgbClr val="000000"/>
+                          </a:solidFill>
+                          <a:effectLst/>
+                          <a:latin typeface="+mn-lt"/>
+                        </a:rPr>
+                        <a:t>&amp; responsibilities</a:t>
+                      </a:r>
+                    </a:p>
+                  </a:txBody>
+                  <a:tcPr marL="5001" marR="5001" marT="5001" marB="0" anchor="ctr" anchorCtr="1">
                     <a:lnL w="19050" cap="flat" cmpd="sng" algn="ctr">
                       <a:solidFill>
                         <a:schemeClr val="tx1"/>
@@ -7646,7 +8270,7 @@
                       <a:tailEnd type="none" w="med" len="med"/>
                     </a:lnB>
                     <a:solidFill>
-                      <a:srgbClr val="DDEBF7"/>
+                      <a:srgbClr val="A0E8FE"/>
                     </a:solidFill>
                   </a:tcPr>
                 </a:tc>
@@ -7664,11 +8288,28 @@
                           <a:effectLst/>
                           <a:latin typeface="+mn-lt"/>
                         </a:rPr>
-                        <a:t>Identify types of data to be collected or created</a:t>
+                        <a:t>Identify </a:t>
                       </a:r>
-                    </a:p>
-                  </a:txBody>
-                  <a:tcPr marL="5001" marR="5001" marT="5001" marB="0" anchor="b">
+                      <a:r>
+                        <a:rPr lang="en-US" sz="1000" b="0" i="0" u="none" strike="noStrike" dirty="0" smtClean="0">
+                          <a:solidFill>
+                            <a:srgbClr val="000000"/>
+                          </a:solidFill>
+                          <a:effectLst/>
+                          <a:latin typeface="+mn-lt"/>
+                        </a:rPr>
+                        <a:t>data types</a:t>
+                      </a:r>
+                      <a:endParaRPr lang="en-US" sz="1000" b="0" i="0" u="none" strike="noStrike" dirty="0">
+                        <a:solidFill>
+                          <a:srgbClr val="000000"/>
+                        </a:solidFill>
+                        <a:effectLst/>
+                        <a:latin typeface="+mn-lt"/>
+                      </a:endParaRPr>
+                    </a:p>
+                  </a:txBody>
+                  <a:tcPr marL="5001" marR="5001" marT="5001" marB="0" anchor="ctr" anchorCtr="1">
                     <a:lnL w="6350" cap="flat" cmpd="sng" algn="ctr">
                       <a:solidFill>
                         <a:srgbClr val="000000"/>
@@ -7706,7 +8347,7 @@
                       <a:tailEnd type="none" w="med" len="med"/>
                     </a:lnB>
                     <a:solidFill>
-                      <a:srgbClr val="DDEBF7"/>
+                      <a:srgbClr val="A0E8FE"/>
                     </a:solidFill>
                   </a:tcPr>
                 </a:tc>
@@ -7724,11 +8365,28 @@
                           <a:effectLst/>
                           <a:latin typeface="+mn-lt"/>
                         </a:rPr>
-                        <a:t>Determine metadata standards to be used</a:t>
+                        <a:t>Determine </a:t>
                       </a:r>
-                    </a:p>
-                  </a:txBody>
-                  <a:tcPr marL="5001" marR="5001" marT="5001" marB="0" anchor="b">
+                      <a:r>
+                        <a:rPr lang="en-US" sz="1000" b="0" i="0" u="none" strike="noStrike" dirty="0" smtClean="0">
+                          <a:solidFill>
+                            <a:srgbClr val="000000"/>
+                          </a:solidFill>
+                          <a:effectLst/>
+                          <a:latin typeface="+mn-lt"/>
+                        </a:rPr>
+                        <a:t>format and metadata standards</a:t>
+                      </a:r>
+                      <a:endParaRPr lang="en-US" sz="1000" b="0" i="0" u="none" strike="noStrike" dirty="0">
+                        <a:solidFill>
+                          <a:srgbClr val="000000"/>
+                        </a:solidFill>
+                        <a:effectLst/>
+                        <a:latin typeface="+mn-lt"/>
+                      </a:endParaRPr>
+                    </a:p>
+                  </a:txBody>
+                  <a:tcPr marL="5001" marR="5001" marT="5001" marB="0" anchor="ctr" anchorCtr="1">
                     <a:lnL w="6350" cap="flat" cmpd="sng" algn="ctr">
                       <a:solidFill>
                         <a:srgbClr val="000000"/>
@@ -7766,7 +8424,7 @@
                       <a:tailEnd type="none" w="med" len="med"/>
                     </a:lnB>
                     <a:solidFill>
-                      <a:srgbClr val="DDEBF7"/>
+                      <a:srgbClr val="A0E8FE"/>
                     </a:solidFill>
                   </a:tcPr>
                 </a:tc>
@@ -7784,11 +8442,28 @@
                           <a:effectLst/>
                           <a:latin typeface="+mn-lt"/>
                         </a:rPr>
-                        <a:t>Determine how data will be manipulated</a:t>
+                        <a:t>Determine </a:t>
                       </a:r>
-                    </a:p>
-                  </a:txBody>
-                  <a:tcPr marL="5001" marR="5001" marT="5001" marB="0" anchor="b">
+                      <a:r>
+                        <a:rPr lang="en-US" sz="1000" b="0" i="0" u="none" strike="noStrike" dirty="0" smtClean="0">
+                          <a:solidFill>
+                            <a:srgbClr val="000000"/>
+                          </a:solidFill>
+                          <a:effectLst/>
+                          <a:latin typeface="+mn-lt"/>
+                        </a:rPr>
+                        <a:t>data processing steps</a:t>
+                      </a:r>
+                      <a:endParaRPr lang="en-US" sz="1000" b="0" i="0" u="none" strike="noStrike" dirty="0">
+                        <a:solidFill>
+                          <a:srgbClr val="000000"/>
+                        </a:solidFill>
+                        <a:effectLst/>
+                        <a:latin typeface="+mn-lt"/>
+                      </a:endParaRPr>
+                    </a:p>
+                  </a:txBody>
+                  <a:tcPr marL="5001" marR="5001" marT="5001" marB="0" anchor="ctr" anchorCtr="1">
                     <a:lnL w="6350" cap="flat" cmpd="sng" algn="ctr">
                       <a:solidFill>
                         <a:srgbClr val="000000"/>
@@ -7826,7 +8501,7 @@
                       <a:tailEnd type="none" w="med" len="med"/>
                     </a:lnB>
                     <a:solidFill>
-                      <a:srgbClr val="DDEBF7"/>
+                      <a:srgbClr val="A0E8FE"/>
                     </a:solidFill>
                   </a:tcPr>
                 </a:tc>
@@ -7844,11 +8519,31 @@
                           <a:effectLst/>
                           <a:latin typeface="+mn-lt"/>
                         </a:rPr>
-                        <a:t>Determine data &amp; metadata QA &amp; QC procedures</a:t>
+                        <a:t>Determine </a:t>
                       </a:r>
-                    </a:p>
-                  </a:txBody>
-                  <a:tcPr marL="5001" marR="5001" marT="5001" marB="0" anchor="b">
+                      <a:r>
+                        <a:rPr lang="en-US" sz="1000" b="0" i="0" u="none" strike="noStrike" dirty="0" smtClean="0">
+                          <a:solidFill>
+                            <a:srgbClr val="000000"/>
+                          </a:solidFill>
+                          <a:effectLst/>
+                          <a:latin typeface="+mn-lt"/>
+                        </a:rPr>
+                        <a:t>QA </a:t>
+                      </a:r>
+                      <a:r>
+                        <a:rPr lang="en-US" sz="1000" b="0" i="0" u="none" strike="noStrike" dirty="0">
+                          <a:solidFill>
+                            <a:srgbClr val="000000"/>
+                          </a:solidFill>
+                          <a:effectLst/>
+                          <a:latin typeface="+mn-lt"/>
+                        </a:rPr>
+                        <a:t>&amp; QC procedures</a:t>
+                      </a:r>
+                    </a:p>
+                  </a:txBody>
+                  <a:tcPr marL="5001" marR="5001" marT="5001" marB="0" anchor="ctr" anchorCtr="1">
                     <a:lnL w="6350" cap="flat" cmpd="sng" algn="ctr">
                       <a:solidFill>
                         <a:srgbClr val="000000"/>
@@ -7886,7 +8581,7 @@
                       <a:tailEnd type="none" w="med" len="med"/>
                     </a:lnB>
                     <a:solidFill>
-                      <a:srgbClr val="DDEBF7"/>
+                      <a:srgbClr val="A0E8FE"/>
                     </a:solidFill>
                   </a:tcPr>
                 </a:tc>
@@ -7908,7 +8603,7 @@
                       </a:r>
                     </a:p>
                   </a:txBody>
-                  <a:tcPr marL="5001" marR="5001" marT="5001" marB="0" anchor="b">
+                  <a:tcPr marL="5001" marR="5001" marT="5001" marB="0" anchor="ctr" anchorCtr="1">
                     <a:lnL w="6350" cap="flat" cmpd="sng" algn="ctr">
                       <a:solidFill>
                         <a:srgbClr val="000000"/>
@@ -7946,7 +8641,7 @@
                       <a:tailEnd type="none" w="med" len="med"/>
                     </a:lnB>
                     <a:solidFill>
-                      <a:srgbClr val="DDEBF7"/>
+                      <a:srgbClr val="A0E8FE"/>
                     </a:solidFill>
                   </a:tcPr>
                 </a:tc>
@@ -7968,7 +8663,7 @@
                       </a:r>
                     </a:p>
                   </a:txBody>
-                  <a:tcPr marL="5001" marR="5001" marT="5001" marB="0" anchor="b">
+                  <a:tcPr marL="5001" marR="5001" marT="5001" marB="0" anchor="ctr" anchorCtr="1">
                     <a:lnL w="6350" cap="flat" cmpd="sng" algn="ctr">
                       <a:solidFill>
                         <a:srgbClr val="000000"/>
@@ -8006,7 +8701,7 @@
                       <a:tailEnd type="none" w="med" len="med"/>
                     </a:lnB>
                     <a:solidFill>
-                      <a:srgbClr val="DDEBF7"/>
+                      <a:srgbClr val="A0E8FE"/>
                     </a:solidFill>
                   </a:tcPr>
                 </a:tc>
@@ -8028,7 +8723,7 @@
                       </a:r>
                     </a:p>
                   </a:txBody>
-                  <a:tcPr marL="5001" marR="5001" marT="5001" marB="0" anchor="b">
+                  <a:tcPr marL="5001" marR="5001" marT="5001" marB="0" anchor="ctr" anchorCtr="1">
                     <a:lnL w="19050" cap="flat" cmpd="sng" algn="ctr">
                       <a:solidFill>
                         <a:schemeClr val="tx1"/>
@@ -8066,7 +8761,7 @@
                       <a:tailEnd type="none" w="med" len="med"/>
                     </a:lnB>
                     <a:solidFill>
-                      <a:srgbClr val="DDEBF7"/>
+                      <a:srgbClr val="A7D5FF"/>
                     </a:solidFill>
                   </a:tcPr>
                 </a:tc>
@@ -8088,7 +8783,7 @@
                       </a:r>
                     </a:p>
                   </a:txBody>
-                  <a:tcPr marL="5001" marR="5001" marT="5001" marB="0" anchor="b">
+                  <a:tcPr marL="5001" marR="5001" marT="5001" marB="0" anchor="ctr" anchorCtr="1">
                     <a:lnL w="6350" cap="flat" cmpd="sng" algn="ctr">
                       <a:solidFill>
                         <a:srgbClr val="000000"/>
@@ -8126,7 +8821,7 @@
                       <a:tailEnd type="none" w="med" len="med"/>
                     </a:lnB>
                     <a:solidFill>
-                      <a:srgbClr val="DDEBF7"/>
+                      <a:srgbClr val="A7D5FF"/>
                     </a:solidFill>
                   </a:tcPr>
                 </a:tc>
@@ -8136,6 +8831,16 @@
                     <a:lstStyle/>
                     <a:p>
                       <a:pPr algn="ctr" fontAlgn="b"/>
+                      <a:r>
+                        <a:rPr lang="en-US" sz="1000" b="0" i="0" u="none" strike="noStrike" dirty="0" smtClean="0">
+                          <a:solidFill>
+                            <a:srgbClr val="000000"/>
+                          </a:solidFill>
+                          <a:effectLst/>
+                          <a:latin typeface="+mn-lt"/>
+                        </a:rPr>
+                        <a:t>Format </a:t>
+                      </a:r>
                       <a:r>
                         <a:rPr lang="en-US" sz="1000" b="0" i="0" u="none" strike="noStrike" dirty="0">
                           <a:solidFill>
@@ -8144,11 +8849,28 @@
                           <a:effectLst/>
                           <a:latin typeface="+mn-lt"/>
                         </a:rPr>
-                        <a:t>Manipulate data for analysis or final archiving</a:t>
+                        <a:t>data for analysis or </a:t>
                       </a:r>
-                    </a:p>
-                  </a:txBody>
-                  <a:tcPr marL="5001" marR="5001" marT="5001" marB="0" anchor="b">
+                      <a:r>
+                        <a:rPr lang="en-US" sz="1000" b="0" i="0" u="none" strike="noStrike" dirty="0" smtClean="0">
+                          <a:solidFill>
+                            <a:srgbClr val="000000"/>
+                          </a:solidFill>
+                          <a:effectLst/>
+                          <a:latin typeface="+mn-lt"/>
+                        </a:rPr>
+                        <a:t>archiving</a:t>
+                      </a:r>
+                      <a:endParaRPr lang="en-US" sz="1000" b="0" i="0" u="none" strike="noStrike" dirty="0">
+                        <a:solidFill>
+                          <a:srgbClr val="000000"/>
+                        </a:solidFill>
+                        <a:effectLst/>
+                        <a:latin typeface="+mn-lt"/>
+                      </a:endParaRPr>
+                    </a:p>
+                  </a:txBody>
+                  <a:tcPr marL="5001" marR="5001" marT="5001" marB="0" anchor="ctr" anchorCtr="1">
                     <a:lnL w="6350" cap="flat" cmpd="sng" algn="ctr">
                       <a:solidFill>
                         <a:srgbClr val="000000"/>
@@ -8186,16 +8908,46 @@
                       <a:tailEnd type="none" w="med" len="med"/>
                     </a:lnB>
                     <a:solidFill>
-                      <a:srgbClr val="DDEBF7"/>
+                      <a:srgbClr val="A7D5FF"/>
                     </a:solidFill>
                   </a:tcPr>
                 </a:tc>
-                <a:tc>
+                <a:tc gridSpan="2">
                   <a:txBody>
                     <a:bodyPr/>
                     <a:lstStyle/>
                     <a:p>
                       <a:pPr algn="ctr" fontAlgn="b"/>
+                      <a:r>
+                        <a:rPr lang="en-US" sz="1000" b="0" i="0" u="none" strike="noStrike" dirty="0" smtClean="0">
+                          <a:solidFill>
+                            <a:srgbClr val="000000"/>
+                          </a:solidFill>
+                          <a:effectLst/>
+                          <a:latin typeface="+mn-lt"/>
+                        </a:rPr>
+                        <a:t>Analyze</a:t>
+                      </a:r>
+                      <a:r>
+                        <a:rPr lang="en-US" sz="1000" b="0" i="0" u="none" strike="noStrike" baseline="0" dirty="0" smtClean="0">
+                          <a:solidFill>
+                            <a:srgbClr val="000000"/>
+                          </a:solidFill>
+                          <a:effectLst/>
+                          <a:latin typeface="+mn-lt"/>
+                        </a:rPr>
+                        <a:t> data</a:t>
+                      </a:r>
+                      <a:r>
+                        <a:rPr lang="en-US" sz="1000" b="0" i="0" u="none" strike="noStrike" dirty="0" smtClean="0">
+                          <a:solidFill>
+                            <a:srgbClr val="000000"/>
+                          </a:solidFill>
+                          <a:effectLst/>
+                          <a:latin typeface="+mn-lt"/>
+                        </a:rPr>
+                        <a:t> </a:t>
+                      </a:r>
                       <a:r>
                         <a:rPr lang="en-US" sz="1000" b="0" i="0" u="none" strike="noStrike" dirty="0">
                           <a:solidFill>
@@ -8204,11 +8956,11 @@
                           <a:effectLst/>
                           <a:latin typeface="+mn-lt"/>
                         </a:rPr>
-                        <a:t>Produce results &amp; products to meet objectives</a:t>
+                        <a:t>to meet objectives</a:t>
                       </a:r>
                     </a:p>
                   </a:txBody>
-                  <a:tcPr marL="5001" marR="5001" marT="5001" marB="0" anchor="b">
+                  <a:tcPr marL="5001" marR="5001" marT="5001" marB="0" anchor="ctr" anchorCtr="1">
                     <a:lnL w="6350" cap="flat" cmpd="sng" algn="ctr">
                       <a:solidFill>
                         <a:srgbClr val="000000"/>
@@ -8246,11 +8998,21 @@
                       <a:tailEnd type="none" w="med" len="med"/>
                     </a:lnB>
                     <a:solidFill>
-                      <a:srgbClr val="DDEBF7"/>
+                      <a:srgbClr val="A7D5FF"/>
                     </a:solidFill>
                   </a:tcPr>
                 </a:tc>
-                <a:tc>
+                <a:tc hMerge="1">
+                  <a:txBody>
+                    <a:bodyPr/>
+                    <a:lstStyle/>
+                    <a:p>
+                      <a:endParaRPr lang="en-US"/>
+                    </a:p>
+                  </a:txBody>
+                  <a:tcPr/>
+                </a:tc>
+                <a:tc gridSpan="2">
                   <a:txBody>
                     <a:bodyPr/>
                     <a:lstStyle/>
@@ -8268,7 +9030,7 @@
                       </a:r>
                     </a:p>
                   </a:txBody>
-                  <a:tcPr marL="5001" marR="5001" marT="5001" marB="0" anchor="b">
+                  <a:tcPr marL="5001" marR="5001" marT="5001" marB="0" anchor="ctr" anchorCtr="1">
                     <a:lnL w="6350" cap="flat" cmpd="sng" algn="ctr">
                       <a:solidFill>
                         <a:srgbClr val="000000"/>
@@ -8306,9 +9068,19 @@
                       <a:tailEnd type="none" w="med" len="med"/>
                     </a:lnB>
                     <a:solidFill>
-                      <a:srgbClr val="DDEBF7"/>
+                      <a:srgbClr val="A7D5FF"/>
                     </a:solidFill>
                   </a:tcPr>
+                </a:tc>
+                <a:tc hMerge="1">
+                  <a:txBody>
+                    <a:bodyPr/>
+                    <a:lstStyle/>
+                    <a:p>
+                      <a:endParaRPr lang="en-US"/>
+                    </a:p>
+                  </a:txBody>
+                  <a:tcPr/>
                 </a:tc>
                 <a:tc gridSpan="2">
                   <a:txBody>
@@ -8324,68 +9096,18 @@
                           <a:effectLst/>
                           <a:latin typeface="+mn-lt"/>
                         </a:rPr>
-                        <a:t>Publish metadata records to data catalog</a:t>
+                        <a:t>Publish </a:t>
                       </a:r>
-                    </a:p>
-                  </a:txBody>
-                  <a:tcPr marL="5001" marR="5001" marT="5001" marB="0" anchor="b">
-                    <a:lnL w="6350" cap="flat" cmpd="sng" algn="ctr">
-                      <a:solidFill>
-                        <a:srgbClr val="000000"/>
-                      </a:solidFill>
-                      <a:prstDash val="solid"/>
-                      <a:round/>
-                      <a:headEnd type="none" w="med" len="med"/>
-                      <a:tailEnd type="none" w="med" len="med"/>
-                    </a:lnL>
-                    <a:lnR w="6350" cap="flat" cmpd="sng" algn="ctr">
-                      <a:solidFill>
-                        <a:srgbClr val="000000"/>
-                      </a:solidFill>
-                      <a:prstDash val="solid"/>
-                      <a:round/>
-                      <a:headEnd type="none" w="med" len="med"/>
-                      <a:tailEnd type="none" w="med" len="med"/>
-                    </a:lnR>
-                    <a:lnT w="6350" cap="flat" cmpd="sng" algn="ctr">
-                      <a:solidFill>
-                        <a:srgbClr val="000000"/>
-                      </a:solidFill>
-                      <a:prstDash val="solid"/>
-                      <a:round/>
-                      <a:headEnd type="none" w="med" len="med"/>
-                      <a:tailEnd type="none" w="med" len="med"/>
-                    </a:lnT>
-                    <a:lnB w="19050" cap="flat" cmpd="sng" algn="ctr">
-                      <a:solidFill>
-                        <a:schemeClr val="tx1"/>
-                      </a:solidFill>
-                      <a:prstDash val="solid"/>
-                      <a:round/>
-                      <a:headEnd type="none" w="med" len="med"/>
-                      <a:tailEnd type="none" w="med" len="med"/>
-                    </a:lnB>
-                    <a:solidFill>
-                      <a:srgbClr val="DDEBF7"/>
-                    </a:solidFill>
-                  </a:tcPr>
-                </a:tc>
-                <a:tc hMerge="1">
-                  <a:txBody>
-                    <a:bodyPr/>
-                    <a:lstStyle/>
-                    <a:p>
-                      <a:endParaRPr lang="en-US"/>
-                    </a:p>
-                  </a:txBody>
-                  <a:tcPr/>
-                </a:tc>
-                <a:tc>
-                  <a:txBody>
-                    <a:bodyPr/>
-                    <a:lstStyle/>
-                    <a:p>
-                      <a:pPr algn="ctr" fontAlgn="b"/>
+                      <a:r>
+                        <a:rPr lang="en-US" sz="1000" b="0" i="0" u="none" strike="noStrike" dirty="0" smtClean="0">
+                          <a:solidFill>
+                            <a:srgbClr val="000000"/>
+                          </a:solidFill>
+                          <a:effectLst/>
+                          <a:latin typeface="+mn-lt"/>
+                        </a:rPr>
+                        <a:t>metadata </a:t>
+                      </a:r>
                       <a:r>
                         <a:rPr lang="en-US" sz="1000" b="0" i="0" u="none" strike="noStrike" dirty="0">
                           <a:solidFill>
@@ -8394,11 +9116,11 @@
                           <a:effectLst/>
                           <a:latin typeface="+mn-lt"/>
                         </a:rPr>
-                        <a:t>Share data with internal &amp; external users</a:t>
+                        <a:t>records to data catalog</a:t>
                       </a:r>
                     </a:p>
                   </a:txBody>
-                  <a:tcPr marL="5001" marR="5001" marT="5001" marB="0" anchor="b">
+                  <a:tcPr marL="5001" marR="5001" marT="5001" marB="0" anchor="ctr" anchorCtr="1">
                     <a:lnL w="6350" cap="flat" cmpd="sng" algn="ctr">
                       <a:solidFill>
                         <a:srgbClr val="000000"/>
@@ -8436,7 +9158,87 @@
                       <a:tailEnd type="none" w="med" len="med"/>
                     </a:lnB>
                     <a:solidFill>
-                      <a:srgbClr val="DDEBF7"/>
+                      <a:srgbClr val="A7D5FF"/>
+                    </a:solidFill>
+                  </a:tcPr>
+                </a:tc>
+                <a:tc hMerge="1">
+                  <a:txBody>
+                    <a:bodyPr/>
+                    <a:lstStyle/>
+                    <a:p>
+                      <a:endParaRPr lang="en-US"/>
+                    </a:p>
+                  </a:txBody>
+                  <a:tcPr/>
+                </a:tc>
+                <a:tc>
+                  <a:txBody>
+                    <a:bodyPr/>
+                    <a:lstStyle/>
+                    <a:p>
+                      <a:pPr algn="ctr" fontAlgn="b"/>
+                      <a:r>
+                        <a:rPr lang="en-US" sz="1000" b="0" i="0" u="none" strike="noStrike" dirty="0" smtClean="0">
+                          <a:solidFill>
+                            <a:srgbClr val="000000"/>
+                          </a:solidFill>
+                          <a:effectLst/>
+                          <a:latin typeface="+mn-lt"/>
+                        </a:rPr>
+                        <a:t>Share data with </a:t>
+                      </a:r>
+                      <a:r>
+                        <a:rPr lang="en-US" sz="1000" b="0" i="0" u="none" strike="noStrike" dirty="0">
+                          <a:solidFill>
+                            <a:srgbClr val="000000"/>
+                          </a:solidFill>
+                          <a:effectLst/>
+                          <a:latin typeface="+mn-lt"/>
+                        </a:rPr>
+                        <a:t>internal &amp; external users</a:t>
+                      </a:r>
+                    </a:p>
+                  </a:txBody>
+                  <a:tcPr marL="5001" marR="5001" marT="5001" marB="0" anchor="ctr" anchorCtr="1">
+                    <a:lnL w="6350" cap="flat" cmpd="sng" algn="ctr">
+                      <a:solidFill>
+                        <a:srgbClr val="000000"/>
+                      </a:solidFill>
+                      <a:prstDash val="solid"/>
+                      <a:round/>
+                      <a:headEnd type="none" w="med" len="med"/>
+                      <a:tailEnd type="none" w="med" len="med"/>
+                    </a:lnL>
+                    <a:lnR w="6350" cap="flat" cmpd="sng" algn="ctr">
+                      <a:solidFill>
+                        <a:srgbClr val="000000"/>
+                      </a:solidFill>
+                      <a:prstDash val="solid"/>
+                      <a:round/>
+                      <a:headEnd type="none" w="med" len="med"/>
+                      <a:tailEnd type="none" w="med" len="med"/>
+                    </a:lnR>
+                    <a:lnT w="6350" cap="flat" cmpd="sng" algn="ctr">
+                      <a:solidFill>
+                        <a:srgbClr val="000000"/>
+                      </a:solidFill>
+                      <a:prstDash val="solid"/>
+                      <a:round/>
+                      <a:headEnd type="none" w="med" len="med"/>
+                      <a:tailEnd type="none" w="med" len="med"/>
+                    </a:lnT>
+                    <a:lnB w="19050" cap="flat" cmpd="sng" algn="ctr">
+                      <a:solidFill>
+                        <a:schemeClr val="tx1"/>
+                      </a:solidFill>
+                      <a:prstDash val="solid"/>
+                      <a:round/>
+                      <a:headEnd type="none" w="med" len="med"/>
+                      <a:tailEnd type="none" w="med" len="med"/>
+                    </a:lnB>
+                    <a:solidFill>
+                      <a:srgbClr val="A7D5FF"/>
                     </a:solidFill>
                   </a:tcPr>
                 </a:tc>
@@ -8601,33 +9403,53 @@
                     </a:solidFill>
                   </a:tcPr>
                 </a:tc>
-                <a:tc gridSpan="15">
+                <a:tc gridSpan="17">
                   <a:txBody>
                     <a:bodyPr/>
                     <a:lstStyle/>
                     <a:p>
                       <a:pPr algn="ctr" fontAlgn="b"/>
                       <a:r>
-                        <a:rPr lang="en-US" sz="1600" b="0" i="0" u="none" strike="noStrike" dirty="0">
+                        <a:rPr lang="en-US" sz="1800" b="1" i="1" u="none" strike="noStrike" dirty="0" smtClean="0">
                           <a:solidFill>
                             <a:srgbClr val="000000"/>
                           </a:solidFill>
                           <a:effectLst/>
                           <a:latin typeface="+mn-lt"/>
                         </a:rPr>
-                        <a:t>Document data and data</a:t>
+                        <a:t>Document</a:t>
                       </a:r>
                       <a:r>
-                        <a:rPr lang="en-US" sz="1600" b="0" i="0" u="none" strike="noStrike" baseline="0" dirty="0">
+                        <a:rPr lang="en-US" sz="1800" b="1" i="1" u="none" strike="noStrike" baseline="0" dirty="0" smtClean="0">
                           <a:solidFill>
                             <a:srgbClr val="000000"/>
                           </a:solidFill>
                           <a:effectLst/>
                           <a:latin typeface="+mn-lt"/>
                         </a:rPr>
-                        <a:t> management strategy – data management plan, metadata</a:t>
+                        <a:t> – d</a:t>
                       </a:r>
-                      <a:endParaRPr lang="en-US" sz="1600" b="0" i="0" u="none" strike="noStrike" dirty="0">
+                      <a:r>
+                        <a:rPr lang="en-US" sz="1800" b="1" i="1" u="none" strike="noStrike" dirty="0" smtClean="0">
+                          <a:solidFill>
+                            <a:srgbClr val="000000"/>
+                          </a:solidFill>
+                          <a:effectLst/>
+                          <a:latin typeface="+mn-lt"/>
+                        </a:rPr>
+                        <a:t>evelop</a:t>
+                      </a:r>
+                      <a:r>
+                        <a:rPr lang="en-US" sz="1800" b="1" i="1" u="none" strike="noStrike" baseline="0" dirty="0" smtClean="0">
+                          <a:solidFill>
+                            <a:srgbClr val="000000"/>
+                          </a:solidFill>
+                          <a:effectLst/>
+                          <a:latin typeface="+mn-lt"/>
+                        </a:rPr>
+                        <a:t> data management plan and create metadata</a:t>
+                      </a:r>
+                      <a:endParaRPr lang="en-US" sz="1800" b="1" i="1" u="none" strike="noStrike" dirty="0">
                         <a:solidFill>
                           <a:srgbClr val="000000"/>
                         </a:solidFill>
@@ -8636,7 +9458,7 @@
                       </a:endParaRPr>
                     </a:p>
                   </a:txBody>
-                  <a:tcPr marL="5001" marR="5001" marT="5001" marB="0" anchor="b">
+                  <a:tcPr marL="5001" marR="5001" marT="5001" marB="0" anchor="ctr">
                     <a:lnL w="19050" cap="flat" cmpd="sng" algn="ctr">
                       <a:solidFill>
                         <a:schemeClr val="tx1"/>
@@ -8674,7 +9496,7 @@
                       <a:tailEnd type="none" w="med" len="med"/>
                     </a:lnB>
                     <a:solidFill>
-                      <a:srgbClr val="DDEBF7"/>
+                      <a:srgbClr val="D8F1FC"/>
                     </a:solidFill>
                   </a:tcPr>
                 </a:tc>
@@ -8865,6 +9687,26 @@
                   </a:txBody>
                   <a:tcPr/>
                 </a:tc>
+                <a:tc hMerge="1">
+                  <a:txBody>
+                    <a:bodyPr/>
+                    <a:lstStyle/>
+                    <a:p>
+                      <a:endParaRPr lang="en-US"/>
+                    </a:p>
+                  </a:txBody>
+                  <a:tcPr/>
+                </a:tc>
+                <a:tc hMerge="1">
+                  <a:txBody>
+                    <a:bodyPr/>
+                    <a:lstStyle/>
+                    <a:p>
+                      <a:endParaRPr lang="en-US"/>
+                    </a:p>
+                  </a:txBody>
+                  <a:tcPr/>
+                </a:tc>
                 <a:tc vMerge="1">
                   <a:txBody>
                     <a:bodyPr/>
@@ -8932,14 +9774,14 @@
                 </a:extLst>
               </a:tr>
               <a:tr h="382142">
-                <a:tc gridSpan="17">
+                <a:tc gridSpan="19">
                   <a:txBody>
                     <a:bodyPr/>
                     <a:lstStyle/>
                     <a:p>
                       <a:pPr algn="ctr" fontAlgn="b"/>
                       <a:r>
-                        <a:rPr lang="en-US" sz="2400" b="0" i="0" u="none" strike="noStrike" dirty="0">
+                        <a:rPr lang="en-US" sz="2800" b="1" i="0" u="none" strike="noStrike" dirty="0">
                           <a:solidFill>
                             <a:srgbClr val="000000"/>
                           </a:solidFill>
@@ -8949,7 +9791,7 @@
                         <a:t>Quality</a:t>
                       </a:r>
                       <a:r>
-                        <a:rPr lang="en-US" sz="2400" b="0" i="0" u="none" strike="noStrike" baseline="0" dirty="0">
+                        <a:rPr lang="en-US" sz="2800" b="1" i="0" u="none" strike="noStrike" baseline="0" dirty="0">
                           <a:solidFill>
                             <a:srgbClr val="000000"/>
                           </a:solidFill>
@@ -8958,7 +9800,7 @@
                         </a:rPr>
                         <a:t> Management</a:t>
                       </a:r>
-                      <a:endParaRPr lang="en-US" sz="2400" b="0" i="0" u="none" strike="noStrike" dirty="0">
+                      <a:endParaRPr lang="en-US" sz="2800" b="1" i="0" u="none" strike="noStrike" dirty="0">
                         <a:solidFill>
                           <a:srgbClr val="000000"/>
                         </a:solidFill>
@@ -9201,6 +10043,26 @@
                       </a:schemeClr>
                     </a:solidFill>
                   </a:tcPr>
+                </a:tc>
+                <a:tc hMerge="1">
+                  <a:txBody>
+                    <a:bodyPr/>
+                    <a:lstStyle/>
+                    <a:p>
+                      <a:endParaRPr lang="en-US"/>
+                    </a:p>
+                  </a:txBody>
+                  <a:tcPr/>
+                </a:tc>
+                <a:tc hMerge="1">
+                  <a:txBody>
+                    <a:bodyPr/>
+                    <a:lstStyle/>
+                    <a:p>
+                      <a:endParaRPr lang="en-US"/>
+                    </a:p>
+                  </a:txBody>
+                  <a:tcPr/>
                 </a:tc>
                 <a:tc hMerge="1">
                   <a:txBody>
@@ -10236,13 +11098,20 @@
     </p:spTree>
     <p:extLst>
       <p:ext uri="{BB962C8B-B14F-4D97-AF65-F5344CB8AC3E}">
-        <p14:creationId xmlns:p14="http://schemas.microsoft.com/office/powerpoint/2010/main" val="3004348976"/>
+        <p14:creationId xmlns:p14="http://schemas.microsoft.com/office/powerpoint/2010/main" val="1072319381"/>
       </p:ext>
     </p:extLst>
   </p:cSld>
   <p:clrMapOvr>
     <a:masterClrMapping/>
   </p:clrMapOvr>
+  <p:timing>
+    <p:tnLst>
+      <p:par>
+        <p:cTn id="1" dur="indefinite" restart="never" nodeType="tmRoot"/>
+      </p:par>
+    </p:tnLst>
+  </p:timing>
 </p:sld>
 </file>
 
@@ -10508,6 +11377,24 @@
 </file>
 
 <file path=customXml/item1.xml><?xml version="1.0" encoding="utf-8"?>
+<?mso-contentType ?>
+<FormTemplates xmlns="http://schemas.microsoft.com/sharepoint/v3/contenttype/forms">
+  <Display>DocumentLibraryForm</Display>
+  <Edit>DocumentLibraryForm</Edit>
+  <New>DocumentLibraryForm</New>
+</FormTemplates>
+</file>
+
+<file path=customXml/item2.xml><?xml version="1.0" encoding="utf-8"?>
+<p:properties xmlns:p="http://schemas.microsoft.com/office/2006/metadata/properties" xmlns:xsi="http://www.w3.org/2001/XMLSchema-instance" xmlns:pc="http://schemas.microsoft.com/office/infopath/2007/PartnerControls">
+  <documentManagement>
+    <_ip_UnifiedCompliancePolicyUIAction xmlns="http://schemas.microsoft.com/sharepoint/v3" xsi:nil="true"/>
+    <_ip_UnifiedCompliancePolicyProperties xmlns="http://schemas.microsoft.com/sharepoint/v3" xsi:nil="true"/>
+  </documentManagement>
+</p:properties>
+</file>
+
+<file path=customXml/item3.xml><?xml version="1.0" encoding="utf-8"?>
 <ct:contentTypeSchema xmlns:ct="http://schemas.microsoft.com/office/2006/metadata/contentType" xmlns:ma="http://schemas.microsoft.com/office/2006/metadata/properties/metaAttributes" ct:_="" ma:_="" ma:contentTypeName="Document" ma:contentTypeID="0x010100ED2BF8B0F630EE46B7EB723CAADB4CC8" ma:contentTypeVersion="11" ma:contentTypeDescription="Create a new document." ma:contentTypeScope="" ma:versionID="11688c5f148c79085a7bce09b0493b30">
   <xsd:schema xmlns:xsd="http://www.w3.org/2001/XMLSchema" xmlns:xs="http://www.w3.org/2001/XMLSchema" xmlns:p="http://schemas.microsoft.com/office/2006/metadata/properties" xmlns:ns1="http://schemas.microsoft.com/sharepoint/v3" xmlns:ns3="ca6d468f-bb3e-4abe-9933-fd505aa2e60b" xmlns:ns4="ea26be6c-567e-4ca9-aae5-67b5e2111b03" targetNamespace="http://schemas.microsoft.com/office/2006/metadata/properties" ma:root="true" ma:fieldsID="e6bc2b07a784ae89ece02e2f31029039" ns1:_="" ns3:_="" ns4:_="">
     <xsd:import namespace="http://schemas.microsoft.com/sharepoint/v3"/>
@@ -10721,25 +11608,33 @@
 </ct:contentTypeSchema>
 </file>
 
-<file path=customXml/item2.xml><?xml version="1.0" encoding="utf-8"?>
-<?mso-contentType ?>
-<FormTemplates xmlns="http://schemas.microsoft.com/sharepoint/v3/contenttype/forms">
-  <Display>DocumentLibraryForm</Display>
-  <Edit>DocumentLibraryForm</Edit>
-  <New>DocumentLibraryForm</New>
-</FormTemplates>
+<file path=customXml/itemProps1.xml><?xml version="1.0" encoding="utf-8"?>
+<ds:datastoreItem xmlns:ds="http://schemas.openxmlformats.org/officeDocument/2006/customXml" ds:itemID="{36F668E9-AC2D-44EF-AD5F-0C5D3678DA4B}">
+  <ds:schemaRefs>
+    <ds:schemaRef ds:uri="http://schemas.microsoft.com/sharepoint/v3/contenttype/forms"/>
+  </ds:schemaRefs>
+</ds:datastoreItem>
 </file>
 
-<file path=customXml/item3.xml><?xml version="1.0" encoding="utf-8"?>
-<p:properties xmlns:p="http://schemas.microsoft.com/office/2006/metadata/properties" xmlns:xsi="http://www.w3.org/2001/XMLSchema-instance" xmlns:pc="http://schemas.microsoft.com/office/infopath/2007/PartnerControls">
-  <documentManagement>
-    <_ip_UnifiedCompliancePolicyUIAction xmlns="http://schemas.microsoft.com/sharepoint/v3" xsi:nil="true"/>
-    <_ip_UnifiedCompliancePolicyProperties xmlns="http://schemas.microsoft.com/sharepoint/v3" xsi:nil="true"/>
-  </documentManagement>
-</p:properties>
+<file path=customXml/itemProps2.xml><?xml version="1.0" encoding="utf-8"?>
+<ds:datastoreItem xmlns:ds="http://schemas.openxmlformats.org/officeDocument/2006/customXml" ds:itemID="{36D9CC0E-9C6E-4CBD-BA3B-8C495C0BFC46}">
+  <ds:schemaRefs>
+    <ds:schemaRef ds:uri="ca6d468f-bb3e-4abe-9933-fd505aa2e60b"/>
+    <ds:schemaRef ds:uri="http://purl.org/dc/elements/1.1/"/>
+    <ds:schemaRef ds:uri="http://schemas.microsoft.com/office/infopath/2007/PartnerControls"/>
+    <ds:schemaRef ds:uri="http://schemas.microsoft.com/office/2006/metadata/properties"/>
+    <ds:schemaRef ds:uri="http://purl.org/dc/dcmitype/"/>
+    <ds:schemaRef ds:uri="http://schemas.microsoft.com/sharepoint/v3"/>
+    <ds:schemaRef ds:uri="http://schemas.microsoft.com/office/2006/documentManagement/types"/>
+    <ds:schemaRef ds:uri="http://purl.org/dc/terms/"/>
+    <ds:schemaRef ds:uri="http://schemas.openxmlformats.org/package/2006/metadata/core-properties"/>
+    <ds:schemaRef ds:uri="ea26be6c-567e-4ca9-aae5-67b5e2111b03"/>
+    <ds:schemaRef ds:uri="http://www.w3.org/XML/1998/namespace"/>
+  </ds:schemaRefs>
+</ds:datastoreItem>
 </file>
 
-<file path=customXml/itemProps1.xml><?xml version="1.0" encoding="utf-8"?>
+<file path=customXml/itemProps3.xml><?xml version="1.0" encoding="utf-8"?>
 <ds:datastoreItem xmlns:ds="http://schemas.openxmlformats.org/officeDocument/2006/customXml" ds:itemID="{A0464C41-041B-466F-BA2C-9CA8107798CC}">
   <ds:schemaRefs>
     <ds:schemaRef ds:uri="http://schemas.microsoft.com/office/2006/metadata/contentType"/>
@@ -10757,30 +11652,4 @@
     <ds:schemaRef ds:uri="http://schemas.microsoft.com/internal/obd"/>
   </ds:schemaRefs>
 </ds:datastoreItem>
-</file>
-
-<file path=customXml/itemProps2.xml><?xml version="1.0" encoding="utf-8"?>
-<ds:datastoreItem xmlns:ds="http://schemas.openxmlformats.org/officeDocument/2006/customXml" ds:itemID="{36F668E9-AC2D-44EF-AD5F-0C5D3678DA4B}">
-  <ds:schemaRefs>
-    <ds:schemaRef ds:uri="http://schemas.microsoft.com/sharepoint/v3/contenttype/forms"/>
-  </ds:schemaRefs>
-</ds:datastoreItem>
-</file>
-
-<file path=customXml/itemProps3.xml><?xml version="1.0" encoding="utf-8"?>
-<ds:datastoreItem xmlns:ds="http://schemas.openxmlformats.org/officeDocument/2006/customXml" ds:itemID="{36D9CC0E-9C6E-4CBD-BA3B-8C495C0BFC46}">
-  <ds:schemaRefs>
-    <ds:schemaRef ds:uri="http://purl.org/dc/elements/1.1/"/>
-    <ds:schemaRef ds:uri="http://schemas.microsoft.com/office/2006/documentManagement/types"/>
-    <ds:schemaRef ds:uri="http://schemas.microsoft.com/office/2006/metadata/properties"/>
-    <ds:schemaRef ds:uri="http://schemas.microsoft.com/sharepoint/v3"/>
-    <ds:schemaRef ds:uri="http://schemas.microsoft.com/office/infopath/2007/PartnerControls"/>
-    <ds:schemaRef ds:uri="http://purl.org/dc/dcmitype/"/>
-    <ds:schemaRef ds:uri="http://schemas.openxmlformats.org/package/2006/metadata/core-properties"/>
-    <ds:schemaRef ds:uri="http://www.w3.org/XML/1998/namespace"/>
-    <ds:schemaRef ds:uri="ea26be6c-567e-4ca9-aae5-67b5e2111b03"/>
-    <ds:schemaRef ds:uri="ca6d468f-bb3e-4abe-9933-fd505aa2e60b"/>
-    <ds:schemaRef ds:uri="http://purl.org/dc/terms/"/>
-  </ds:schemaRefs>
-</ds:datastoreItem>
 </file>
</xml_diff>